<commit_message>
More improvements to tex notes
</commit_message>
<xml_diff>
--- a/doc/Efficient Visual-Inertial Navigation using Euler angles.pptx
+++ b/doc/Efficient Visual-Inertial Navigation using Euler angles.pptx
@@ -264,7 +264,7 @@
           <a:p>
             <a:fld id="{9B8BC073-511C-4D2E-9689-7AD20FB62E96}" type="datetimeFigureOut">
               <a:rPr lang="en-AU" smtClean="0"/>
-              <a:t>30/05/2016</a:t>
+              <a:t>31/05/2016</a:t>
             </a:fld>
             <a:endParaRPr lang="en-AU"/>
           </a:p>
@@ -434,7 +434,7 @@
           <a:p>
             <a:fld id="{9B8BC073-511C-4D2E-9689-7AD20FB62E96}" type="datetimeFigureOut">
               <a:rPr lang="en-AU" smtClean="0"/>
-              <a:t>30/05/2016</a:t>
+              <a:t>31/05/2016</a:t>
             </a:fld>
             <a:endParaRPr lang="en-AU"/>
           </a:p>
@@ -614,7 +614,7 @@
           <a:p>
             <a:fld id="{9B8BC073-511C-4D2E-9689-7AD20FB62E96}" type="datetimeFigureOut">
               <a:rPr lang="en-AU" smtClean="0"/>
-              <a:t>30/05/2016</a:t>
+              <a:t>31/05/2016</a:t>
             </a:fld>
             <a:endParaRPr lang="en-AU"/>
           </a:p>
@@ -784,7 +784,7 @@
           <a:p>
             <a:fld id="{9B8BC073-511C-4D2E-9689-7AD20FB62E96}" type="datetimeFigureOut">
               <a:rPr lang="en-AU" smtClean="0"/>
-              <a:t>30/05/2016</a:t>
+              <a:t>31/05/2016</a:t>
             </a:fld>
             <a:endParaRPr lang="en-AU"/>
           </a:p>
@@ -1030,7 +1030,7 @@
           <a:p>
             <a:fld id="{9B8BC073-511C-4D2E-9689-7AD20FB62E96}" type="datetimeFigureOut">
               <a:rPr lang="en-AU" smtClean="0"/>
-              <a:t>30/05/2016</a:t>
+              <a:t>31/05/2016</a:t>
             </a:fld>
             <a:endParaRPr lang="en-AU"/>
           </a:p>
@@ -1262,7 +1262,7 @@
           <a:p>
             <a:fld id="{9B8BC073-511C-4D2E-9689-7AD20FB62E96}" type="datetimeFigureOut">
               <a:rPr lang="en-AU" smtClean="0"/>
-              <a:t>30/05/2016</a:t>
+              <a:t>31/05/2016</a:t>
             </a:fld>
             <a:endParaRPr lang="en-AU"/>
           </a:p>
@@ -1629,7 +1629,7 @@
           <a:p>
             <a:fld id="{9B8BC073-511C-4D2E-9689-7AD20FB62E96}" type="datetimeFigureOut">
               <a:rPr lang="en-AU" smtClean="0"/>
-              <a:t>30/05/2016</a:t>
+              <a:t>31/05/2016</a:t>
             </a:fld>
             <a:endParaRPr lang="en-AU"/>
           </a:p>
@@ -1747,7 +1747,7 @@
           <a:p>
             <a:fld id="{9B8BC073-511C-4D2E-9689-7AD20FB62E96}" type="datetimeFigureOut">
               <a:rPr lang="en-AU" smtClean="0"/>
-              <a:t>30/05/2016</a:t>
+              <a:t>31/05/2016</a:t>
             </a:fld>
             <a:endParaRPr lang="en-AU"/>
           </a:p>
@@ -1842,7 +1842,7 @@
           <a:p>
             <a:fld id="{9B8BC073-511C-4D2E-9689-7AD20FB62E96}" type="datetimeFigureOut">
               <a:rPr lang="en-AU" smtClean="0"/>
-              <a:t>30/05/2016</a:t>
+              <a:t>31/05/2016</a:t>
             </a:fld>
             <a:endParaRPr lang="en-AU"/>
           </a:p>
@@ -2119,7 +2119,7 @@
           <a:p>
             <a:fld id="{9B8BC073-511C-4D2E-9689-7AD20FB62E96}" type="datetimeFigureOut">
               <a:rPr lang="en-AU" smtClean="0"/>
-              <a:t>30/05/2016</a:t>
+              <a:t>31/05/2016</a:t>
             </a:fld>
             <a:endParaRPr lang="en-AU"/>
           </a:p>
@@ -2372,7 +2372,7 @@
           <a:p>
             <a:fld id="{9B8BC073-511C-4D2E-9689-7AD20FB62E96}" type="datetimeFigureOut">
               <a:rPr lang="en-AU" smtClean="0"/>
-              <a:t>30/05/2016</a:t>
+              <a:t>31/05/2016</a:t>
             </a:fld>
             <a:endParaRPr lang="en-AU"/>
           </a:p>
@@ -2585,7 +2585,7 @@
           <a:p>
             <a:fld id="{9B8BC073-511C-4D2E-9689-7AD20FB62E96}" type="datetimeFigureOut">
               <a:rPr lang="en-AU" smtClean="0"/>
-              <a:t>30/05/2016</a:t>
+              <a:t>31/05/2016</a:t>
             </a:fld>
             <a:endParaRPr lang="en-AU"/>
           </a:p>
@@ -5208,6 +5208,15 @@
                   </a:rPr>
                   <a:t>Process model:</a:t>
                 </a:r>
+                <a:r>
+                  <a:rPr lang="en-US" sz="1400" b="0" i="1" dirty="0">
+                    <a:solidFill>
+                      <a:srgbClr val="002060"/>
+                    </a:solidFill>
+                    <a:latin typeface="Cambria Math"/>
+                  </a:rPr>
+                  <a:t/>
+                </a:r>
                 <a:br>
                   <a:rPr lang="en-US" sz="1400" b="0" i="1" dirty="0">
                     <a:solidFill>
@@ -5459,6 +5468,16 @@
                     </m:r>
                   </m:oMath>
                 </a14:m>
+                <a:r>
+                  <a:rPr lang="en-US" sz="1400" b="0" i="0" dirty="0">
+                    <a:solidFill>
+                      <a:srgbClr val="002060"/>
+                    </a:solidFill>
+                    <a:latin typeface="Cambria Math"/>
+                    <a:ea typeface="Cambria Math"/>
+                  </a:rPr>
+                  <a:t/>
+                </a:r>
                 <a:br>
                   <a:rPr lang="en-US" sz="1400" b="0" i="0" dirty="0">
                     <a:solidFill>
@@ -5724,6 +5743,16 @@
                     </m:r>
                   </m:oMath>
                 </a14:m>
+                <a:r>
+                  <a:rPr lang="en-US" sz="1400" b="0" i="1" dirty="0">
+                    <a:solidFill>
+                      <a:srgbClr val="002060"/>
+                    </a:solidFill>
+                    <a:latin typeface="Cambria Math"/>
+                    <a:ea typeface="Cambria Math"/>
+                  </a:rPr>
+                  <a:t/>
+                </a:r>
                 <a:br>
                   <a:rPr lang="en-US" sz="1400" b="0" i="1" dirty="0">
                     <a:solidFill>
@@ -7817,6 +7846,14 @@
                   <a:rPr lang="en-US" sz="1800" dirty="0"/>
                   <a:t>: Inertial delta -- integrated IMU data points (over key frame duration) </a:t>
                 </a:r>
+                <a:r>
+                  <a:rPr lang="en-US" sz="1800" dirty="0">
+                    <a:solidFill>
+                      <a:srgbClr val="002060"/>
+                    </a:solidFill>
+                  </a:rPr>
+                  <a:t/>
+                </a:r>
                 <a:br>
                   <a:rPr lang="en-US" sz="1800" dirty="0">
                     <a:solidFill>
@@ -8005,6 +8042,14 @@
                     </a:solidFill>
                   </a:rPr>
                 </a:br>
+                <a:r>
+                  <a:rPr lang="en-US" sz="1800" dirty="0">
+                    <a:solidFill>
+                      <a:srgbClr val="002060"/>
+                    </a:solidFill>
+                  </a:rPr>
+                  <a:t/>
+                </a:r>
                 <a:br>
                   <a:rPr lang="en-US" sz="1800" dirty="0">
                     <a:solidFill>
@@ -8890,6 +8935,10 @@
                     <a:ea typeface="Cambria Math"/>
                   </a:rPr>
                   <a:t> 4)</a:t>
+                </a:r>
+                <a:r>
+                  <a:rPr lang="en-US" sz="1700" dirty="0"/>
+                  <a:t/>
                 </a:r>
                 <a:br>
                   <a:rPr lang="en-US" sz="1700" dirty="0"/>
@@ -9697,6 +9746,10 @@
                   </a:spcAft>
                   <a:buNone/>
                 </a:pPr>
+                <a:r>
+                  <a:rPr lang="en-US" sz="1600" dirty="0"/>
+                  <a:t/>
+                </a:r>
                 <a:br>
                   <a:rPr lang="en-US" sz="1600" dirty="0"/>
                 </a:br>
@@ -12227,376 +12280,1198 @@
       </p:pic>
       <p:grpSp>
         <p:nvGrpSpPr>
-          <p:cNvPr id="1044" name="Group 1043"/>
+          <p:cNvPr id="22" name="Group 21"/>
           <p:cNvGrpSpPr/>
           <p:nvPr/>
         </p:nvGrpSpPr>
         <p:grpSpPr>
           <a:xfrm>
-            <a:off x="341890" y="4052525"/>
-            <a:ext cx="5737273" cy="2127227"/>
-            <a:chOff x="268941" y="4544294"/>
-            <a:chExt cx="5737273" cy="2127227"/>
+            <a:off x="233081" y="4048207"/>
+            <a:ext cx="5762098" cy="2302975"/>
+            <a:chOff x="233081" y="4048207"/>
+            <a:chExt cx="5762098" cy="2302975"/>
           </a:xfrm>
         </p:grpSpPr>
-        <p:sp>
-          <p:nvSpPr>
-            <p:cNvPr id="9" name="TextBox 8"/>
-            <p:cNvSpPr txBox="1"/>
-            <p:nvPr/>
-          </p:nvSpPr>
-          <p:spPr>
-            <a:xfrm>
-              <a:off x="1129931" y="4544294"/>
-              <a:ext cx="3469398" cy="369332"/>
-            </a:xfrm>
-            <a:prstGeom prst="rect">
-              <a:avLst/>
-            </a:prstGeom>
-            <a:noFill/>
-          </p:spPr>
-          <p:txBody>
-            <a:bodyPr wrap="square" rtlCol="0">
-              <a:spAutoFit/>
-            </a:bodyPr>
-            <a:lstStyle/>
-            <a:p>
-              <a:r>
-                <a:rPr lang="en-US" b="1" dirty="0"/>
-                <a:t>Pre-integration in recursive form</a:t>
-              </a:r>
-              <a:endParaRPr lang="en-AU" b="1" dirty="0"/>
-            </a:p>
-          </p:txBody>
-        </p:sp>
+        <mc:AlternateContent xmlns:mc="http://schemas.openxmlformats.org/markup-compatibility/2006">
+          <mc:Choice xmlns:a14="http://schemas.microsoft.com/office/drawing/2010/main" Requires="a14">
+            <p:sp>
+              <p:nvSpPr>
+                <p:cNvPr id="5" name="TextBox 4"/>
+                <p:cNvSpPr txBox="1"/>
+                <p:nvPr/>
+              </p:nvSpPr>
+              <p:spPr>
+                <a:xfrm>
+                  <a:off x="2411813" y="5222232"/>
+                  <a:ext cx="465789" cy="419538"/>
+                </a:xfrm>
+                <a:prstGeom prst="rect">
+                  <a:avLst/>
+                </a:prstGeom>
+                <a:noFill/>
+              </p:spPr>
+              <p:txBody>
+                <a:bodyPr wrap="square" rtlCol="0">
+                  <a:spAutoFit/>
+                </a:bodyPr>
+                <a:lstStyle/>
+                <a:p>
+                  <a14:m>
+                    <m:oMathPara xmlns:m="http://schemas.openxmlformats.org/officeDocument/2006/math">
+                      <m:oMathParaPr>
+                        <m:jc m:val="centerGroup"/>
+                      </m:oMathParaPr>
+                      <m:oMath xmlns:m="http://schemas.openxmlformats.org/officeDocument/2006/math">
+                        <m:r>
+                          <a:rPr lang="el-GR" i="1">
+                            <a:latin typeface="Cambria Math"/>
+                          </a:rPr>
+                          <m:t>⨋</m:t>
+                        </m:r>
+                      </m:oMath>
+                    </m:oMathPara>
+                  </a14:m>
+                  <a:endParaRPr lang="en-AU" dirty="0"/>
+                </a:p>
+              </p:txBody>
+            </p:sp>
+          </mc:Choice>
+          <mc:Fallback>
+            <p:sp>
+              <p:nvSpPr>
+                <p:cNvPr id="5" name="TextBox 4"/>
+                <p:cNvSpPr txBox="1">
+                  <a:spLocks noRot="1" noChangeAspect="1" noMove="1" noResize="1" noEditPoints="1" noAdjustHandles="1" noChangeArrowheads="1" noChangeShapeType="1" noTextEdit="1"/>
+                </p:cNvSpPr>
+                <p:nvPr/>
+              </p:nvSpPr>
+              <p:spPr>
+                <a:xfrm>
+                  <a:off x="2411813" y="5222232"/>
+                  <a:ext cx="465789" cy="419538"/>
+                </a:xfrm>
+                <a:prstGeom prst="rect">
+                  <a:avLst/>
+                </a:prstGeom>
+                <a:blipFill rotWithShape="0">
+                  <a:blip r:embed="rId5"/>
+                  <a:stretch>
+                    <a:fillRect t="-2941" r="-1316" b="-25000"/>
+                  </a:stretch>
+                </a:blipFill>
+              </p:spPr>
+              <p:txBody>
+                <a:bodyPr/>
+                <a:lstStyle/>
+                <a:p>
+                  <a:r>
+                    <a:rPr lang="en-AU">
+                      <a:noFill/>
+                    </a:rPr>
+                    <a:t> </a:t>
+                  </a:r>
+                </a:p>
+              </p:txBody>
+            </p:sp>
+          </mc:Fallback>
+        </mc:AlternateContent>
+        <mc:AlternateContent xmlns:mc="http://schemas.openxmlformats.org/markup-compatibility/2006">
+          <mc:Choice xmlns:a14="http://schemas.microsoft.com/office/drawing/2010/main" Requires="a14">
+            <p:sp>
+              <p:nvSpPr>
+                <p:cNvPr id="21" name="TextBox 20"/>
+                <p:cNvSpPr txBox="1"/>
+                <p:nvPr/>
+              </p:nvSpPr>
+              <p:spPr>
+                <a:xfrm>
+                  <a:off x="267496" y="5480189"/>
+                  <a:ext cx="1263244" cy="695319"/>
+                </a:xfrm>
+                <a:prstGeom prst="rect">
+                  <a:avLst/>
+                </a:prstGeom>
+                <a:noFill/>
+              </p:spPr>
+              <p:txBody>
+                <a:bodyPr wrap="square" rtlCol="0">
+                  <a:spAutoFit/>
+                </a:bodyPr>
+                <a:lstStyle/>
+                <a:p>
+                  <a:pPr/>
+                  <a14:m>
+                    <m:oMathPara xmlns:m="http://schemas.openxmlformats.org/officeDocument/2006/math">
+                      <m:oMathParaPr>
+                        <m:jc m:val="centerGroup"/>
+                      </m:oMathParaPr>
+                      <m:oMath xmlns:m="http://schemas.openxmlformats.org/officeDocument/2006/math">
+                        <m:r>
+                          <m:rPr>
+                            <m:nor/>
+                          </m:rPr>
+                          <a:rPr lang="en-AU" sz="1200" dirty="0" smtClean="0">
+                            <a:latin typeface="Palace Script MT" pitchFamily="66" charset="0"/>
+                          </a:rPr>
+                          <m:t>N</m:t>
+                        </m:r>
+                        <m:r>
+                          <a:rPr lang="en-US" sz="1200" b="0" i="1" dirty="0" smtClean="0">
+                            <a:latin typeface="Cambria Math"/>
+                          </a:rPr>
+                          <m:t>(</m:t>
+                        </m:r>
+                        <m:m>
+                          <m:mPr>
+                            <m:mcs>
+                              <m:mc>
+                                <m:mcPr>
+                                  <m:count m:val="1"/>
+                                  <m:mcJc m:val="center"/>
+                                </m:mcPr>
+                              </m:mc>
+                            </m:mcs>
+                            <m:ctrlPr>
+                              <a:rPr lang="en-US" sz="1200" i="1">
+                                <a:latin typeface="Cambria Math" panose="02040503050406030204" pitchFamily="18" charset="0"/>
+                              </a:rPr>
+                            </m:ctrlPr>
+                          </m:mPr>
+                          <m:mr>
+                            <m:e>
+                              <m:r>
+                                <a:rPr lang="en-AU" sz="1200" i="1">
+                                  <a:latin typeface="Cambria Math"/>
+                                  <a:ea typeface="Cambria Math"/>
+                                </a:rPr>
+                                <m:t>∆</m:t>
+                              </m:r>
+                              <m:sSub>
+                                <m:sSubPr>
+                                  <m:ctrlPr>
+                                    <a:rPr lang="en-AU" sz="1200" i="1" smtClean="0">
+                                      <a:latin typeface="Cambria Math" panose="02040503050406030204" pitchFamily="18" charset="0"/>
+                                      <a:ea typeface="Cambria Math"/>
+                                    </a:rPr>
+                                  </m:ctrlPr>
+                                </m:sSubPr>
+                                <m:e>
+                                  <m:r>
+                                    <a:rPr lang="en-US" sz="1200" b="1" i="1" smtClean="0">
+                                      <a:latin typeface="Cambria Math" panose="02040503050406030204" pitchFamily="18" charset="0"/>
+                                      <a:ea typeface="Cambria Math"/>
+                                    </a:rPr>
+                                    <m:t>𝑨</m:t>
+                                  </m:r>
+                                </m:e>
+                                <m:sub>
+                                  <m:r>
+                                    <a:rPr lang="en-US" sz="1200" b="0" i="1" smtClean="0">
+                                      <a:latin typeface="Cambria Math"/>
+                                      <a:ea typeface="Cambria Math"/>
+                                    </a:rPr>
+                                    <m:t>𝑖</m:t>
+                                  </m:r>
+                                  <m:r>
+                                    <a:rPr lang="en-US" sz="1200" b="0" i="1" smtClean="0">
+                                      <a:latin typeface="Cambria Math"/>
+                                      <a:ea typeface="Cambria Math"/>
+                                    </a:rPr>
+                                    <m:t>,</m:t>
+                                  </m:r>
+                                  <m:r>
+                                    <a:rPr lang="en-US" sz="1200" b="0" i="1" smtClean="0">
+                                      <a:latin typeface="Cambria Math"/>
+                                      <a:ea typeface="Cambria Math"/>
+                                    </a:rPr>
+                                    <m:t>𝑘</m:t>
+                                  </m:r>
+                                </m:sub>
+                              </m:sSub>
+                            </m:e>
+                          </m:mr>
+                          <m:mr>
+                            <m:e>
+                              <m:r>
+                                <a:rPr lang="en-AU" sz="1200" i="1">
+                                  <a:latin typeface="Cambria Math"/>
+                                  <a:ea typeface="Cambria Math"/>
+                                </a:rPr>
+                                <m:t>∆</m:t>
+                              </m:r>
+                              <m:sSub>
+                                <m:sSubPr>
+                                  <m:ctrlPr>
+                                    <a:rPr lang="en-AU" sz="1200" i="1">
+                                      <a:latin typeface="Cambria Math" panose="02040503050406030204" pitchFamily="18" charset="0"/>
+                                      <a:ea typeface="Cambria Math"/>
+                                    </a:rPr>
+                                  </m:ctrlPr>
+                                </m:sSubPr>
+                                <m:e>
+                                  <m:r>
+                                    <a:rPr lang="en-US" sz="1200" b="1" i="1" smtClean="0">
+                                      <a:latin typeface="Cambria Math"/>
+                                      <a:ea typeface="Cambria Math"/>
+                                    </a:rPr>
+                                    <m:t>𝒗</m:t>
+                                  </m:r>
+                                </m:e>
+                                <m:sub>
+                                  <m:r>
+                                    <a:rPr lang="en-US" sz="1200" b="0" i="1" smtClean="0">
+                                      <a:latin typeface="Cambria Math"/>
+                                      <a:ea typeface="Cambria Math"/>
+                                    </a:rPr>
+                                    <m:t>𝑖</m:t>
+                                  </m:r>
+                                  <m:r>
+                                    <a:rPr lang="en-US" sz="1200" b="0" i="1" smtClean="0">
+                                      <a:latin typeface="Cambria Math"/>
+                                      <a:ea typeface="Cambria Math"/>
+                                    </a:rPr>
+                                    <m:t>,</m:t>
+                                  </m:r>
+                                  <m:r>
+                                    <a:rPr lang="en-US" sz="1200" i="1">
+                                      <a:latin typeface="Cambria Math"/>
+                                      <a:ea typeface="Cambria Math"/>
+                                    </a:rPr>
+                                    <m:t>𝑘</m:t>
+                                  </m:r>
+                                </m:sub>
+                              </m:sSub>
+                            </m:e>
+                          </m:mr>
+                          <m:mr>
+                            <m:e>
+                              <m:r>
+                                <a:rPr lang="en-AU" sz="1200" i="1">
+                                  <a:latin typeface="Cambria Math"/>
+                                  <a:ea typeface="Cambria Math"/>
+                                </a:rPr>
+                                <m:t>∆</m:t>
+                              </m:r>
+                              <m:sSubSup>
+                                <m:sSubSupPr>
+                                  <m:ctrlPr>
+                                    <a:rPr lang="en-AU" sz="1200" i="1">
+                                      <a:latin typeface="Cambria Math" panose="02040503050406030204" pitchFamily="18" charset="0"/>
+                                    </a:rPr>
+                                  </m:ctrlPr>
+                                </m:sSubSupPr>
+                                <m:e>
+                                  <m:r>
+                                    <a:rPr lang="en-US" sz="1200" b="1" i="1">
+                                      <a:latin typeface="Cambria Math"/>
+                                    </a:rPr>
+                                    <m:t>𝒑</m:t>
+                                  </m:r>
+                                </m:e>
+                                <m:sub>
+                                  <m:r>
+                                    <a:rPr lang="en-US" sz="1200" b="0" i="1" smtClean="0">
+                                      <a:latin typeface="Cambria Math"/>
+                                    </a:rPr>
+                                    <m:t>𝑖</m:t>
+                                  </m:r>
+                                  <m:r>
+                                    <a:rPr lang="en-US" sz="1200" b="0" i="1" smtClean="0">
+                                      <a:latin typeface="Cambria Math"/>
+                                    </a:rPr>
+                                    <m:t>, </m:t>
+                                  </m:r>
+                                  <m:r>
+                                    <a:rPr lang="en-US" sz="1200" b="0" i="1" smtClean="0">
+                                      <a:latin typeface="Cambria Math"/>
+                                    </a:rPr>
+                                    <m:t>𝑘</m:t>
+                                  </m:r>
+                                </m:sub>
+                                <m:sup>
+                                  <m:r>
+                                    <a:rPr lang="en-US" sz="1200" i="1">
+                                      <a:latin typeface="Cambria Math"/>
+                                    </a:rPr>
+                                    <m:t>+</m:t>
+                                  </m:r>
+                                </m:sup>
+                              </m:sSubSup>
+                            </m:e>
+                          </m:mr>
+                        </m:m>
+                        <m:r>
+                          <a:rPr lang="en-US" sz="1200" b="0" i="1" smtClean="0">
+                            <a:latin typeface="Cambria Math"/>
+                          </a:rPr>
+                          <m:t>,</m:t>
+                        </m:r>
+                        <m:r>
+                          <m:rPr>
+                            <m:nor/>
+                          </m:rPr>
+                          <a:rPr lang="el-GR" sz="1200" dirty="0"/>
+                          <m:t>Σ</m:t>
+                        </m:r>
+                        <m:r>
+                          <m:rPr>
+                            <m:nor/>
+                          </m:rPr>
+                          <a:rPr lang="en-US" sz="1200" b="0" i="0" baseline="-25000" dirty="0" smtClean="0"/>
+                          <m:t>k</m:t>
+                        </m:r>
+                        <m:r>
+                          <a:rPr lang="en-US" sz="1200" b="0" i="1" dirty="0" smtClean="0">
+                            <a:latin typeface="Cambria Math"/>
+                          </a:rPr>
+                          <m:t>)</m:t>
+                        </m:r>
+                      </m:oMath>
+                    </m:oMathPara>
+                  </a14:m>
+                  <a:endParaRPr lang="en-AU" sz="1200" dirty="0"/>
+                </a:p>
+              </p:txBody>
+            </p:sp>
+          </mc:Choice>
+          <mc:Fallback>
+            <p:sp>
+              <p:nvSpPr>
+                <p:cNvPr id="21" name="TextBox 20"/>
+                <p:cNvSpPr txBox="1">
+                  <a:spLocks noRot="1" noChangeAspect="1" noMove="1" noResize="1" noEditPoints="1" noAdjustHandles="1" noChangeArrowheads="1" noChangeShapeType="1" noTextEdit="1"/>
+                </p:cNvSpPr>
+                <p:nvPr/>
+              </p:nvSpPr>
+              <p:spPr>
+                <a:xfrm>
+                  <a:off x="267496" y="5480189"/>
+                  <a:ext cx="1263244" cy="695319"/>
+                </a:xfrm>
+                <a:prstGeom prst="rect">
+                  <a:avLst/>
+                </a:prstGeom>
+                <a:blipFill rotWithShape="0">
+                  <a:blip r:embed="rId6"/>
+                  <a:stretch>
+                    <a:fillRect/>
+                  </a:stretch>
+                </a:blipFill>
+              </p:spPr>
+              <p:txBody>
+                <a:bodyPr/>
+                <a:lstStyle/>
+                <a:p>
+                  <a:r>
+                    <a:rPr lang="en-AU">
+                      <a:noFill/>
+                    </a:rPr>
+                    <a:t> </a:t>
+                  </a:r>
+                </a:p>
+              </p:txBody>
+            </p:sp>
+          </mc:Fallback>
+        </mc:AlternateContent>
         <p:grpSp>
           <p:nvGrpSpPr>
-            <p:cNvPr id="1041" name="Group 1040"/>
+            <p:cNvPr id="1044" name="Group 1043"/>
             <p:cNvGrpSpPr/>
             <p:nvPr/>
           </p:nvGrpSpPr>
           <p:grpSpPr>
             <a:xfrm>
-              <a:off x="268941" y="4920012"/>
-              <a:ext cx="3998272" cy="1259740"/>
-              <a:chOff x="206181" y="5021903"/>
-              <a:chExt cx="4706471" cy="1259740"/>
+              <a:off x="233081" y="4048207"/>
+              <a:ext cx="5762098" cy="2302975"/>
+              <a:chOff x="268941" y="4544294"/>
+              <a:chExt cx="5762098" cy="1832746"/>
             </a:xfrm>
+            <a:solidFill>
+              <a:schemeClr val="bg1"/>
+            </a:solidFill>
           </p:grpSpPr>
+          <p:sp>
+            <p:nvSpPr>
+              <p:cNvPr id="9" name="TextBox 8"/>
+              <p:cNvSpPr txBox="1"/>
+              <p:nvPr/>
+            </p:nvSpPr>
+            <p:spPr>
+              <a:xfrm>
+                <a:off x="1129931" y="4544294"/>
+                <a:ext cx="3469398" cy="369332"/>
+              </a:xfrm>
+              <a:prstGeom prst="rect">
+                <a:avLst/>
+              </a:prstGeom>
+              <a:grpFill/>
+            </p:spPr>
+            <p:txBody>
+              <a:bodyPr wrap="square" rtlCol="0">
+                <a:spAutoFit/>
+              </a:bodyPr>
+              <a:lstStyle/>
+              <a:p>
+                <a:r>
+                  <a:rPr lang="en-US" b="1" dirty="0"/>
+                  <a:t>Pre-integration in recursive form</a:t>
+                </a:r>
+                <a:endParaRPr lang="en-AU" b="1" dirty="0"/>
+              </a:p>
+            </p:txBody>
+          </p:sp>
+          <p:grpSp>
+            <p:nvGrpSpPr>
+              <p:cNvPr id="1041" name="Group 1040"/>
+              <p:cNvGrpSpPr/>
+              <p:nvPr/>
+            </p:nvGrpSpPr>
+            <p:grpSpPr>
+              <a:xfrm>
+                <a:off x="268941" y="4920012"/>
+                <a:ext cx="4554919" cy="1259740"/>
+                <a:chOff x="206181" y="5021903"/>
+                <a:chExt cx="5361713" cy="1259740"/>
+              </a:xfrm>
+              <a:grpFill/>
+            </p:grpSpPr>
+            <mc:AlternateContent xmlns:mc="http://schemas.openxmlformats.org/markup-compatibility/2006">
+              <mc:Choice xmlns:a14="http://schemas.microsoft.com/office/drawing/2010/main" Requires="a14">
+                <p:sp>
+                  <p:nvSpPr>
+                    <p:cNvPr id="11" name="TextBox 10"/>
+                    <p:cNvSpPr txBox="1"/>
+                    <p:nvPr/>
+                  </p:nvSpPr>
+                  <p:spPr>
+                    <a:xfrm>
+                      <a:off x="206181" y="5021903"/>
+                      <a:ext cx="1781938" cy="954107"/>
+                    </a:xfrm>
+                    <a:prstGeom prst="rect">
+                      <a:avLst/>
+                    </a:prstGeom>
+                    <a:grpFill/>
+                  </p:spPr>
+                  <p:txBody>
+                    <a:bodyPr wrap="square" rtlCol="0">
+                      <a:spAutoFit/>
+                    </a:bodyPr>
+                    <a:lstStyle/>
+                    <a:p>
+                      <a:r>
+                        <a:rPr lang="en-AU" sz="1400" dirty="0"/>
+                        <a:t>Angular velocity </a:t>
+                      </a:r>
+                    </a:p>
+                    <a:p>
+                      <a:r>
+                        <a:rPr lang="en-AU" sz="1400" dirty="0"/>
+                        <a:t> </a:t>
+                      </a:r>
+                      <a:r>
+                        <a:rPr lang="en-AU" sz="1200" dirty="0"/>
+                        <a:t>~ </a:t>
+                      </a:r>
+                      <a:r>
+                        <a:rPr lang="en-AU" sz="1200" dirty="0">
+                          <a:latin typeface="Palace Script MT" pitchFamily="66" charset="0"/>
+                        </a:rPr>
+                        <a:t>N </a:t>
+                      </a:r>
+                      <a:r>
+                        <a:rPr lang="en-AU" sz="1200" dirty="0" smtClean="0"/>
+                        <a:t>(</a:t>
+                      </a:r>
+                      <a:r>
+                        <a:rPr lang="el-GR" sz="1200" b="1" dirty="0" smtClean="0"/>
+                        <a:t>ω</a:t>
+                      </a:r>
+                      <a:r>
+                        <a:rPr lang="en-AU" sz="1200" baseline="30000" dirty="0" err="1" smtClean="0"/>
+                        <a:t>b</a:t>
+                      </a:r>
+                      <a:r>
+                        <a:rPr lang="en-AU" sz="1200" baseline="-25000" dirty="0" err="1" smtClean="0"/>
+                        <a:t>k</a:t>
+                      </a:r>
+                      <a:r>
+                        <a:rPr lang="en-AU" sz="1200" baseline="-25000" dirty="0" smtClean="0"/>
+                        <a:t> </a:t>
+                      </a:r>
+                      <a:r>
+                        <a:rPr lang="en-AU" sz="1200" dirty="0" smtClean="0"/>
+                        <a:t>- </a:t>
+                      </a:r>
+                      <a:r>
+                        <a:rPr lang="en-AU" sz="1200" b="1" dirty="0" smtClean="0">
+                          <a:solidFill>
+                            <a:srgbClr val="002060"/>
+                          </a:solidFill>
+                        </a:rPr>
+                        <a:t>b</a:t>
+                      </a:r>
+                      <a:r>
+                        <a:rPr lang="el-GR" sz="1200" b="1" baseline="-25000" dirty="0" smtClean="0"/>
+                        <a:t>ω</a:t>
+                      </a:r>
+                      <a:r>
+                        <a:rPr lang="en-US" sz="1200" b="1" dirty="0" smtClean="0">
+                          <a:solidFill>
+                            <a:srgbClr val="0070C0"/>
+                          </a:solidFill>
+                        </a:rPr>
+                        <a:t>, </a:t>
+                      </a:r>
+                      <a14:m>
+                        <m:oMath xmlns:m="http://schemas.openxmlformats.org/officeDocument/2006/math">
+                          <m:r>
+                            <a:rPr lang="en-US" sz="1200" b="1">
+                              <a:latin typeface="Cambria Math"/>
+                              <a:ea typeface="Cambria Math"/>
+                            </a:rPr>
+                            <m:t>𝛈</m:t>
+                          </m:r>
+                          <m:r>
+                            <a:rPr lang="en-US" sz="1200" i="1" baseline="-25000">
+                              <a:latin typeface="Cambria Math"/>
+                              <a:ea typeface="Cambria Math"/>
+                            </a:rPr>
+                            <m:t>𝑘</m:t>
+                          </m:r>
+                          <m:r>
+                            <m:rPr>
+                              <m:sty m:val="p"/>
+                            </m:rPr>
+                            <a:rPr lang="en-US" sz="1200" baseline="30000">
+                              <a:latin typeface="Cambria Math"/>
+                              <a:ea typeface="Cambria Math"/>
+                            </a:rPr>
+                            <m:t>g</m:t>
+                          </m:r>
+                        </m:oMath>
+                      </a14:m>
+                      <a:r>
+                        <a:rPr lang="en-AU" sz="1200" baseline="-25000" dirty="0">
+                          <a:solidFill>
+                            <a:srgbClr val="0070C0"/>
+                          </a:solidFill>
+                        </a:rPr>
+                        <a:t> </a:t>
+                      </a:r>
+                      <a:r>
+                        <a:rPr lang="en-AU" sz="1200" dirty="0">
+                          <a:solidFill>
+                            <a:srgbClr val="0070C0"/>
+                          </a:solidFill>
+                        </a:rPr>
+                        <a:t>)</a:t>
+                      </a:r>
+                    </a:p>
+                    <a:p>
+                      <a:r>
+                        <a:rPr lang="en-AU" sz="1400" dirty="0"/>
+                        <a:t>Linear </a:t>
+                      </a:r>
+                      <a:r>
+                        <a:rPr lang="en-AU" sz="1400" dirty="0" err="1"/>
+                        <a:t>accel</a:t>
+                      </a:r>
+                      <a:r>
+                        <a:rPr lang="en-AU" sz="1400" dirty="0"/>
+                        <a:t>:</a:t>
+                      </a:r>
+                      <a:endParaRPr lang="en-AU" sz="1400" b="1" dirty="0">
+                        <a:solidFill>
+                          <a:srgbClr val="0070C0"/>
+                        </a:solidFill>
+                      </a:endParaRPr>
+                    </a:p>
+                    <a:p>
+                      <a:r>
+                        <a:rPr lang="en-AU" sz="1200" dirty="0">
+                          <a:latin typeface="Palace Script MT" pitchFamily="66" charset="0"/>
+                        </a:rPr>
+                        <a:t>~ N </a:t>
+                      </a:r>
+                      <a:r>
+                        <a:rPr lang="en-AU" sz="1200" dirty="0"/>
+                        <a:t>(</a:t>
+                      </a:r>
+                      <a:r>
+                        <a:rPr lang="en-US" sz="1200" b="1" dirty="0" err="1" smtClean="0">
+                          <a:solidFill>
+                            <a:srgbClr val="002060"/>
+                          </a:solidFill>
+                        </a:rPr>
+                        <a:t>f</a:t>
+                      </a:r>
+                      <a:r>
+                        <a:rPr lang="en-US" sz="1200" b="1" baseline="30000" dirty="0" err="1" smtClean="0">
+                          <a:solidFill>
+                            <a:srgbClr val="002060"/>
+                          </a:solidFill>
+                        </a:rPr>
+                        <a:t>b</a:t>
+                      </a:r>
+                      <a:r>
+                        <a:rPr lang="en-US" sz="1200" b="1" baseline="-25000" dirty="0" err="1" smtClean="0">
+                          <a:solidFill>
+                            <a:srgbClr val="002060"/>
+                          </a:solidFill>
+                        </a:rPr>
+                        <a:t>k</a:t>
+                      </a:r>
+                      <a:r>
+                        <a:rPr lang="en-US" sz="1200" b="1" baseline="-25000" dirty="0" smtClean="0">
+                          <a:solidFill>
+                            <a:srgbClr val="002060"/>
+                          </a:solidFill>
+                        </a:rPr>
+                        <a:t> </a:t>
+                      </a:r>
+                      <a:r>
+                        <a:rPr lang="en-US" sz="1200" b="1" dirty="0" smtClean="0">
+                          <a:solidFill>
+                            <a:srgbClr val="002060"/>
+                          </a:solidFill>
+                        </a:rPr>
+                        <a:t>- b</a:t>
+                      </a:r>
+                      <a:r>
+                        <a:rPr lang="en-US" sz="1200" b="1" baseline="-25000" dirty="0" smtClean="0">
+                          <a:solidFill>
+                            <a:srgbClr val="002060"/>
+                          </a:solidFill>
+                        </a:rPr>
+                        <a:t>f</a:t>
+                      </a:r>
+                      <a:r>
+                        <a:rPr lang="en-US" sz="1200" b="1" dirty="0" smtClean="0">
+                          <a:solidFill>
+                            <a:srgbClr val="0070C0"/>
+                          </a:solidFill>
+                        </a:rPr>
+                        <a:t>, </a:t>
+                      </a:r>
+                      <a14:m>
+                        <m:oMath xmlns:m="http://schemas.openxmlformats.org/officeDocument/2006/math">
+                          <m:r>
+                            <a:rPr lang="en-US" sz="1200" b="1">
+                              <a:latin typeface="Cambria Math"/>
+                              <a:ea typeface="Cambria Math"/>
+                            </a:rPr>
+                            <m:t>𝛈</m:t>
+                          </m:r>
+                          <m:r>
+                            <a:rPr lang="en-US" sz="1200" i="1" baseline="-25000">
+                              <a:latin typeface="Cambria Math"/>
+                              <a:ea typeface="Cambria Math"/>
+                            </a:rPr>
+                            <m:t>𝑘</m:t>
+                          </m:r>
+                          <m:r>
+                            <m:rPr>
+                              <m:sty m:val="p"/>
+                            </m:rPr>
+                            <a:rPr lang="en-US" sz="1200" baseline="30000">
+                              <a:latin typeface="Cambria Math"/>
+                              <a:ea typeface="Cambria Math"/>
+                            </a:rPr>
+                            <m:t>g</m:t>
+                          </m:r>
+                        </m:oMath>
+                      </a14:m>
+                      <a:r>
+                        <a:rPr lang="en-AU" sz="1200" baseline="-25000" dirty="0">
+                          <a:solidFill>
+                            <a:srgbClr val="0070C0"/>
+                          </a:solidFill>
+                        </a:rPr>
+                        <a:t> </a:t>
+                      </a:r>
+                      <a:r>
+                        <a:rPr lang="en-AU" sz="1200" dirty="0">
+                          <a:solidFill>
+                            <a:srgbClr val="0070C0"/>
+                          </a:solidFill>
+                        </a:rPr>
+                        <a:t>)</a:t>
+                      </a:r>
+                    </a:p>
+                  </p:txBody>
+                </p:sp>
+              </mc:Choice>
+              <mc:Fallback>
+                <p:sp>
+                  <p:nvSpPr>
+                    <p:cNvPr id="11" name="TextBox 10"/>
+                    <p:cNvSpPr txBox="1">
+                      <a:spLocks noRot="1" noChangeAspect="1" noMove="1" noResize="1" noEditPoints="1" noAdjustHandles="1" noChangeArrowheads="1" noChangeShapeType="1" noTextEdit="1"/>
+                    </p:cNvSpPr>
+                    <p:nvPr/>
+                  </p:nvSpPr>
+                  <p:spPr>
+                    <a:xfrm>
+                      <a:off x="206181" y="5021903"/>
+                      <a:ext cx="1781938" cy="954107"/>
+                    </a:xfrm>
+                    <a:prstGeom prst="rect">
+                      <a:avLst/>
+                    </a:prstGeom>
+                    <a:blipFill rotWithShape="0">
+                      <a:blip r:embed="rId7"/>
+                      <a:stretch>
+                        <a:fillRect l="-1205" t="-1020"/>
+                      </a:stretch>
+                    </a:blipFill>
+                  </p:spPr>
+                  <p:txBody>
+                    <a:bodyPr/>
+                    <a:lstStyle/>
+                    <a:p>
+                      <a:r>
+                        <a:rPr lang="en-AU">
+                          <a:noFill/>
+                        </a:rPr>
+                        <a:t> </a:t>
+                      </a:r>
+                    </a:p>
+                  </p:txBody>
+                </p:sp>
+              </mc:Fallback>
+            </mc:AlternateContent>
+            <mc:AlternateContent xmlns:mc="http://schemas.openxmlformats.org/markup-compatibility/2006">
+              <mc:Choice xmlns:a14="http://schemas.microsoft.com/office/drawing/2010/main" Requires="a14">
+                <p:sp>
+                  <p:nvSpPr>
+                    <p:cNvPr id="14" name="TextBox 13"/>
+                    <p:cNvSpPr txBox="1"/>
+                    <p:nvPr/>
+                  </p:nvSpPr>
+                  <p:spPr>
+                    <a:xfrm>
+                      <a:off x="2191176" y="5179617"/>
+                      <a:ext cx="2342165" cy="244934"/>
+                    </a:xfrm>
+                    <a:prstGeom prst="rect">
+                      <a:avLst/>
+                    </a:prstGeom>
+                    <a:grpFill/>
+                    <a:ln>
+                      <a:noFill/>
+                    </a:ln>
+                  </p:spPr>
+                  <p:txBody>
+                    <a:bodyPr wrap="square" rtlCol="0" anchor="ctr" anchorCtr="0">
+                      <a:spAutoFit/>
+                    </a:bodyPr>
+                    <a:lstStyle/>
+                    <a:p>
+                      <a:pPr/>
+                      <a14:m>
+                        <m:oMathPara xmlns:m="http://schemas.openxmlformats.org/officeDocument/2006/math">
+                          <m:oMathParaPr>
+                            <m:jc m:val="centerGroup"/>
+                          </m:oMathParaPr>
+                          <m:oMath xmlns:m="http://schemas.openxmlformats.org/officeDocument/2006/math">
+                            <m:r>
+                              <a:rPr lang="en-AU" sz="1400" i="1" smtClean="0">
+                                <a:latin typeface="Cambria Math" panose="02040503050406030204" pitchFamily="18" charset="0"/>
+                                <a:ea typeface="Cambria Math" panose="02040503050406030204" pitchFamily="18" charset="0"/>
+                              </a:rPr>
+                              <m:t>∆</m:t>
+                            </m:r>
+                            <m:sSub>
+                              <m:sSubPr>
+                                <m:ctrlPr>
+                                  <a:rPr lang="en-AU" sz="1400" i="1">
+                                    <a:latin typeface="Cambria Math" panose="02040503050406030204" pitchFamily="18" charset="0"/>
+                                    <a:ea typeface="Cambria Math" panose="02040503050406030204" pitchFamily="18" charset="0"/>
+                                  </a:rPr>
+                                </m:ctrlPr>
+                              </m:sSubPr>
+                              <m:e>
+                                <m:r>
+                                  <a:rPr lang="en-AU" sz="1400" b="0" i="1" smtClean="0">
+                                    <a:latin typeface="Cambria Math" panose="02040503050406030204" pitchFamily="18" charset="0"/>
+                                  </a:rPr>
+                                  <m:t>𝐼</m:t>
+                                </m:r>
+                              </m:e>
+                              <m:sub>
+                                <m:r>
+                                  <a:rPr lang="en-AU" sz="1400" i="1">
+                                    <a:latin typeface="Cambria Math" panose="02040503050406030204" pitchFamily="18" charset="0"/>
+                                  </a:rPr>
+                                  <m:t>𝑘</m:t>
+                                </m:r>
+                              </m:sub>
+                            </m:sSub>
+                            <m:r>
+                              <a:rPr lang="en-AU" sz="1400" i="1">
+                                <a:latin typeface="Cambria Math" panose="02040503050406030204" pitchFamily="18" charset="0"/>
+                              </a:rPr>
+                              <m:t>=</m:t>
+                            </m:r>
+                            <m:r>
+                              <a:rPr lang="en-AU" sz="1400" b="0" i="1" smtClean="0">
+                                <a:latin typeface="Cambria Math" panose="02040503050406030204" pitchFamily="18" charset="0"/>
+                              </a:rPr>
+                              <m:t>𝑓</m:t>
+                            </m:r>
+                            <m:r>
+                              <a:rPr lang="en-AU" sz="1400" i="1">
+                                <a:latin typeface="Cambria Math" panose="02040503050406030204" pitchFamily="18" charset="0"/>
+                              </a:rPr>
+                              <m:t>(</m:t>
+                            </m:r>
+                            <m:r>
+                              <a:rPr lang="en-AU" sz="1400" b="0" i="1" smtClean="0">
+                                <a:latin typeface="Cambria Math" panose="02040503050406030204" pitchFamily="18" charset="0"/>
+                                <a:ea typeface="Cambria Math" panose="02040503050406030204" pitchFamily="18" charset="0"/>
+                              </a:rPr>
+                              <m:t>∆</m:t>
+                            </m:r>
+                            <m:r>
+                              <a:rPr lang="en-AU" sz="1400" b="0" i="1" smtClean="0">
+                                <a:latin typeface="Cambria Math" panose="02040503050406030204" pitchFamily="18" charset="0"/>
+                              </a:rPr>
+                              <m:t> </m:t>
+                            </m:r>
+                            <m:sSub>
+                              <m:sSubPr>
+                                <m:ctrlPr>
+                                  <a:rPr lang="en-AU" sz="1400" b="0" i="1" smtClean="0">
+                                    <a:latin typeface="Cambria Math" panose="02040503050406030204" pitchFamily="18" charset="0"/>
+                                  </a:rPr>
+                                </m:ctrlPr>
+                              </m:sSubPr>
+                              <m:e>
+                                <m:r>
+                                  <a:rPr lang="en-AU" sz="1400" i="1">
+                                    <a:latin typeface="Cambria Math" panose="02040503050406030204" pitchFamily="18" charset="0"/>
+                                  </a:rPr>
+                                  <m:t>𝐼</m:t>
+                                </m:r>
+                              </m:e>
+                              <m:sub>
+                                <m:r>
+                                  <a:rPr lang="en-AU" sz="1400" i="1">
+                                    <a:latin typeface="Cambria Math" panose="02040503050406030204" pitchFamily="18" charset="0"/>
+                                  </a:rPr>
+                                  <m:t>𝑘</m:t>
+                                </m:r>
+                                <m:r>
+                                  <a:rPr lang="en-AU" sz="1400" i="1">
+                                    <a:latin typeface="Cambria Math" panose="02040503050406030204" pitchFamily="18" charset="0"/>
+                                  </a:rPr>
+                                  <m:t>−1</m:t>
+                                </m:r>
+                              </m:sub>
+                            </m:sSub>
+                            <m:r>
+                              <a:rPr lang="en-AU" sz="1400" i="1">
+                                <a:latin typeface="Cambria Math" panose="02040503050406030204" pitchFamily="18" charset="0"/>
+                              </a:rPr>
+                              <m:t>) +</m:t>
+                            </m:r>
+                            <m:sSub>
+                              <m:sSubPr>
+                                <m:ctrlPr>
+                                  <a:rPr lang="en-AU" sz="1400" b="0" i="1" smtClean="0">
+                                    <a:latin typeface="Cambria Math" panose="02040503050406030204" pitchFamily="18" charset="0"/>
+                                  </a:rPr>
+                                </m:ctrlPr>
+                              </m:sSubPr>
+                              <m:e>
+                                <m:r>
+                                  <a:rPr lang="en-AU" sz="1400" b="0" i="1" smtClean="0">
+                                    <a:latin typeface="Cambria Math" panose="02040503050406030204" pitchFamily="18" charset="0"/>
+                                  </a:rPr>
+                                  <m:t>𝑤</m:t>
+                                </m:r>
+                              </m:e>
+                              <m:sub>
+                                <m:r>
+                                  <a:rPr lang="en-AU" sz="1400" b="0" i="1" smtClean="0">
+                                    <a:latin typeface="Cambria Math" panose="02040503050406030204" pitchFamily="18" charset="0"/>
+                                  </a:rPr>
+                                  <m:t>𝑘</m:t>
+                                </m:r>
+                              </m:sub>
+                            </m:sSub>
+                          </m:oMath>
+                        </m:oMathPara>
+                      </a14:m>
+                      <a:endParaRPr lang="en-AU" sz="1400" dirty="0"/>
+                    </a:p>
+                  </p:txBody>
+                </p:sp>
+              </mc:Choice>
+              <mc:Fallback>
+                <p:sp>
+                  <p:nvSpPr>
+                    <p:cNvPr id="14" name="TextBox 13"/>
+                    <p:cNvSpPr txBox="1">
+                      <a:spLocks noRot="1" noChangeAspect="1" noMove="1" noResize="1" noEditPoints="1" noAdjustHandles="1" noChangeArrowheads="1" noChangeShapeType="1" noTextEdit="1"/>
+                    </p:cNvSpPr>
+                    <p:nvPr/>
+                  </p:nvSpPr>
+                  <p:spPr>
+                    <a:xfrm>
+                      <a:off x="2191176" y="5179617"/>
+                      <a:ext cx="2342165" cy="244934"/>
+                    </a:xfrm>
+                    <a:prstGeom prst="rect">
+                      <a:avLst/>
+                    </a:prstGeom>
+                    <a:blipFill rotWithShape="0">
+                      <a:blip r:embed="rId8"/>
+                      <a:stretch>
+                        <a:fillRect b="-5882"/>
+                      </a:stretch>
+                    </a:blipFill>
+                    <a:ln>
+                      <a:noFill/>
+                    </a:ln>
+                  </p:spPr>
+                  <p:txBody>
+                    <a:bodyPr/>
+                    <a:lstStyle/>
+                    <a:p>
+                      <a:r>
+                        <a:rPr lang="en-AU">
+                          <a:noFill/>
+                        </a:rPr>
+                        <a:t> </a:t>
+                      </a:r>
+                    </a:p>
+                  </p:txBody>
+                </p:sp>
+              </mc:Fallback>
+            </mc:AlternateContent>
+            <p:cxnSp>
+              <p:nvCxnSpPr>
+                <p:cNvPr id="18" name="Straight Arrow Connector 17"/>
+                <p:cNvCxnSpPr/>
+                <p:nvPr/>
+              </p:nvCxnSpPr>
+              <p:spPr>
+                <a:xfrm flipV="1">
+                  <a:off x="4635610" y="5550068"/>
+                  <a:ext cx="932284" cy="12324"/>
+                </a:xfrm>
+                <a:prstGeom prst="straightConnector1">
+                  <a:avLst/>
+                </a:prstGeom>
+                <a:grpFill/>
+                <a:ln>
+                  <a:tailEnd type="triangle"/>
+                </a:ln>
+              </p:spPr>
+              <p:style>
+                <a:lnRef idx="1">
+                  <a:schemeClr val="accent1"/>
+                </a:lnRef>
+                <a:fillRef idx="0">
+                  <a:schemeClr val="accent1"/>
+                </a:fillRef>
+                <a:effectRef idx="0">
+                  <a:schemeClr val="accent1"/>
+                </a:effectRef>
+                <a:fontRef idx="minor">
+                  <a:schemeClr val="tx1"/>
+                </a:fontRef>
+              </p:style>
+            </p:cxnSp>
+            <p:cxnSp>
+              <p:nvCxnSpPr>
+                <p:cNvPr id="20" name="Elbow Connector 19"/>
+                <p:cNvCxnSpPr/>
+                <p:nvPr/>
+              </p:nvCxnSpPr>
+              <p:spPr>
+                <a:xfrm rot="10800000" flipV="1">
+                  <a:off x="4162316" y="5558141"/>
+                  <a:ext cx="858372" cy="717153"/>
+                </a:xfrm>
+                <a:prstGeom prst="bentConnector3">
+                  <a:avLst>
+                    <a:gd name="adj1" fmla="val 3003"/>
+                  </a:avLst>
+                </a:prstGeom>
+                <a:grpFill/>
+                <a:ln>
+                  <a:tailEnd type="arrow"/>
+                </a:ln>
+              </p:spPr>
+              <p:style>
+                <a:lnRef idx="1">
+                  <a:schemeClr val="accent1"/>
+                </a:lnRef>
+                <a:fillRef idx="0">
+                  <a:schemeClr val="accent1"/>
+                </a:fillRef>
+                <a:effectRef idx="0">
+                  <a:schemeClr val="accent1"/>
+                </a:effectRef>
+                <a:fontRef idx="minor">
+                  <a:schemeClr val="tx1"/>
+                </a:fontRef>
+              </p:style>
+            </p:cxnSp>
+            <p:cxnSp>
+              <p:nvCxnSpPr>
+                <p:cNvPr id="1032" name="Straight Arrow Connector 1031"/>
+                <p:cNvCxnSpPr/>
+                <p:nvPr/>
+              </p:nvCxnSpPr>
+              <p:spPr>
+                <a:xfrm flipV="1">
+                  <a:off x="1568817" y="5818094"/>
+                  <a:ext cx="555812" cy="6350"/>
+                </a:xfrm>
+                <a:prstGeom prst="straightConnector1">
+                  <a:avLst/>
+                </a:prstGeom>
+                <a:grpFill/>
+                <a:ln>
+                  <a:tailEnd type="arrow"/>
+                </a:ln>
+              </p:spPr>
+              <p:style>
+                <a:lnRef idx="1">
+                  <a:schemeClr val="accent1"/>
+                </a:lnRef>
+                <a:fillRef idx="0">
+                  <a:schemeClr val="accent1"/>
+                </a:fillRef>
+                <a:effectRef idx="0">
+                  <a:schemeClr val="accent1"/>
+                </a:effectRef>
+                <a:fontRef idx="minor">
+                  <a:schemeClr val="tx1"/>
+                </a:fontRef>
+              </p:style>
+            </p:cxnSp>
+            <p:cxnSp>
+              <p:nvCxnSpPr>
+                <p:cNvPr id="1035" name="Elbow Connector 1034"/>
+                <p:cNvCxnSpPr/>
+                <p:nvPr/>
+              </p:nvCxnSpPr>
+              <p:spPr>
+                <a:xfrm rot="5400000">
+                  <a:off x="1340218" y="6053043"/>
+                  <a:ext cx="457199" cy="1"/>
+                </a:xfrm>
+                <a:prstGeom prst="bentConnector3">
+                  <a:avLst/>
+                </a:prstGeom>
+                <a:grpFill/>
+              </p:spPr>
+              <p:style>
+                <a:lnRef idx="1">
+                  <a:schemeClr val="accent1"/>
+                </a:lnRef>
+                <a:fillRef idx="0">
+                  <a:schemeClr val="accent1"/>
+                </a:fillRef>
+                <a:effectRef idx="0">
+                  <a:schemeClr val="accent1"/>
+                </a:effectRef>
+                <a:fontRef idx="minor">
+                  <a:schemeClr val="tx1"/>
+                </a:fontRef>
+              </p:style>
+            </p:cxnSp>
+            <p:cxnSp>
+              <p:nvCxnSpPr>
+                <p:cNvPr id="1039" name="Elbow Connector 1038"/>
+                <p:cNvCxnSpPr/>
+                <p:nvPr/>
+              </p:nvCxnSpPr>
+              <p:spPr>
+                <a:xfrm flipV="1">
+                  <a:off x="1568819" y="6275295"/>
+                  <a:ext cx="2568193" cy="2"/>
+                </a:xfrm>
+                <a:prstGeom prst="bentConnector3">
+                  <a:avLst/>
+                </a:prstGeom>
+                <a:grpFill/>
+              </p:spPr>
+              <p:style>
+                <a:lnRef idx="1">
+                  <a:schemeClr val="accent1"/>
+                </a:lnRef>
+                <a:fillRef idx="0">
+                  <a:schemeClr val="accent1"/>
+                </a:fillRef>
+                <a:effectRef idx="0">
+                  <a:schemeClr val="accent1"/>
+                </a:effectRef>
+                <a:fontRef idx="minor">
+                  <a:schemeClr val="tx1"/>
+                </a:fontRef>
+              </p:style>
+            </p:cxnSp>
+            <p:cxnSp>
+              <p:nvCxnSpPr>
+                <p:cNvPr id="13" name="Straight Arrow Connector 12"/>
+                <p:cNvCxnSpPr/>
+                <p:nvPr/>
+              </p:nvCxnSpPr>
+              <p:spPr>
+                <a:xfrm flipV="1">
+                  <a:off x="206181" y="5538406"/>
+                  <a:ext cx="1918448" cy="12554"/>
+                </a:xfrm>
+                <a:prstGeom prst="straightConnector1">
+                  <a:avLst/>
+                </a:prstGeom>
+                <a:grpFill/>
+                <a:ln>
+                  <a:tailEnd type="triangle"/>
+                </a:ln>
+              </p:spPr>
+              <p:style>
+                <a:lnRef idx="1">
+                  <a:schemeClr val="accent1"/>
+                </a:lnRef>
+                <a:fillRef idx="0">
+                  <a:schemeClr val="accent1"/>
+                </a:fillRef>
+                <a:effectRef idx="0">
+                  <a:schemeClr val="accent1"/>
+                </a:effectRef>
+                <a:fontRef idx="minor">
+                  <a:schemeClr val="tx1"/>
+                </a:fontRef>
+              </p:style>
+            </p:cxnSp>
+          </p:grpSp>
           <mc:AlternateContent xmlns:mc="http://schemas.openxmlformats.org/markup-compatibility/2006">
             <mc:Choice xmlns:a14="http://schemas.microsoft.com/office/drawing/2010/main" Requires="a14">
               <p:sp>
                 <p:nvSpPr>
-                  <p:cNvPr id="11" name="TextBox 10"/>
+                  <p:cNvPr id="1042" name="TextBox 1041"/>
                   <p:cNvSpPr txBox="1"/>
                   <p:nvPr/>
                 </p:nvSpPr>
                 <p:spPr>
                   <a:xfrm>
-                    <a:off x="206181" y="5021903"/>
-                    <a:ext cx="1781938" cy="954107"/>
+                    <a:off x="4852102" y="5045987"/>
+                    <a:ext cx="1178937" cy="553346"/>
                   </a:xfrm>
                   <a:prstGeom prst="rect">
                     <a:avLst/>
                   </a:prstGeom>
-                  <a:noFill/>
+                  <a:grpFill/>
                 </p:spPr>
                 <p:txBody>
                   <a:bodyPr wrap="square" rtlCol="0">
-                    <a:spAutoFit/>
-                  </a:bodyPr>
-                  <a:lstStyle/>
-                  <a:p>
-                    <a:r>
-                      <a:rPr lang="en-AU" sz="1400" dirty="0"/>
-                      <a:t>Angular velocity </a:t>
-                    </a:r>
-                  </a:p>
-                  <a:p>
-                    <a:r>
-                      <a:rPr lang="en-AU" sz="1400" dirty="0"/>
-                      <a:t> ~ </a:t>
-                    </a:r>
-                    <a:r>
-                      <a:rPr lang="en-AU" sz="1400" dirty="0">
-                        <a:latin typeface="Palace Script MT" pitchFamily="66" charset="0"/>
-                      </a:rPr>
-                      <a:t>N </a:t>
-                    </a:r>
-                    <a:r>
-                      <a:rPr lang="en-AU" sz="1400" dirty="0"/>
-                      <a:t>(</a:t>
-                    </a:r>
-                    <a:r>
-                      <a:rPr lang="el-GR" sz="1400" b="1" dirty="0">
-                        <a:solidFill>
-                          <a:srgbClr val="002060"/>
-                        </a:solidFill>
-                      </a:rPr>
-                      <a:t>ω</a:t>
-                    </a:r>
-                    <a:r>
-                      <a:rPr lang="en-US" sz="1400" b="1" baseline="30000" dirty="0">
-                        <a:solidFill>
-                          <a:srgbClr val="002060"/>
-                        </a:solidFill>
-                      </a:rPr>
-                      <a:t>b</a:t>
-                    </a:r>
-                    <a:r>
-                      <a:rPr lang="en-US" sz="1400" b="1" dirty="0">
-                        <a:solidFill>
-                          <a:srgbClr val="0070C0"/>
-                        </a:solidFill>
-                      </a:rPr>
-                      <a:t>, </a:t>
-                    </a:r>
-                    <a14:m>
-                      <m:oMath xmlns:m="http://schemas.openxmlformats.org/officeDocument/2006/math">
-                        <m:r>
-                          <a:rPr lang="en-US" sz="1400" b="1">
-                            <a:latin typeface="Cambria Math"/>
-                            <a:ea typeface="Cambria Math"/>
-                          </a:rPr>
-                          <m:t>𝛈</m:t>
-                        </m:r>
-                        <m:r>
-                          <a:rPr lang="en-US" sz="1400" i="1" baseline="-25000">
-                            <a:latin typeface="Cambria Math"/>
-                            <a:ea typeface="Cambria Math"/>
-                          </a:rPr>
-                          <m:t>𝑘</m:t>
-                        </m:r>
-                        <m:r>
-                          <m:rPr>
-                            <m:sty m:val="p"/>
-                          </m:rPr>
-                          <a:rPr lang="en-US" sz="1400" baseline="30000">
-                            <a:latin typeface="Cambria Math"/>
-                            <a:ea typeface="Cambria Math"/>
-                          </a:rPr>
-                          <m:t>g</m:t>
-                        </m:r>
-                      </m:oMath>
-                    </a14:m>
-                    <a:r>
-                      <a:rPr lang="en-AU" sz="1400" baseline="-25000" dirty="0">
-                        <a:solidFill>
-                          <a:srgbClr val="0070C0"/>
-                        </a:solidFill>
-                      </a:rPr>
-                      <a:t> </a:t>
-                    </a:r>
-                    <a:r>
-                      <a:rPr lang="en-AU" sz="1400" dirty="0">
-                        <a:solidFill>
-                          <a:srgbClr val="0070C0"/>
-                        </a:solidFill>
-                      </a:rPr>
-                      <a:t>)</a:t>
-                    </a:r>
-                  </a:p>
-                  <a:p>
-                    <a:r>
-                      <a:rPr lang="en-AU" sz="1400" dirty="0"/>
-                      <a:t>Linear </a:t>
-                    </a:r>
-                    <a:r>
-                      <a:rPr lang="en-AU" sz="1400" dirty="0" err="1"/>
-                      <a:t>accel</a:t>
-                    </a:r>
-                    <a:r>
-                      <a:rPr lang="en-AU" sz="1400" dirty="0"/>
-                      <a:t>:</a:t>
-                    </a:r>
-                    <a:endParaRPr lang="en-AU" sz="1400" b="1" dirty="0">
-                      <a:solidFill>
-                        <a:srgbClr val="0070C0"/>
-                      </a:solidFill>
-                    </a:endParaRPr>
-                  </a:p>
-                  <a:p>
-                    <a:r>
-                      <a:rPr lang="en-AU" sz="1400" dirty="0">
-                        <a:latin typeface="Palace Script MT" pitchFamily="66" charset="0"/>
-                      </a:rPr>
-                      <a:t>~ N </a:t>
-                    </a:r>
-                    <a:r>
-                      <a:rPr lang="en-AU" sz="1400" dirty="0"/>
-                      <a:t>(</a:t>
-                    </a:r>
-                    <a:r>
-                      <a:rPr lang="en-US" sz="1400" b="1" dirty="0">
-                        <a:solidFill>
-                          <a:srgbClr val="002060"/>
-                        </a:solidFill>
-                      </a:rPr>
-                      <a:t>f</a:t>
-                    </a:r>
-                    <a:r>
-                      <a:rPr lang="en-US" sz="1400" b="1" baseline="30000" dirty="0">
-                        <a:solidFill>
-                          <a:srgbClr val="002060"/>
-                        </a:solidFill>
-                      </a:rPr>
-                      <a:t>b</a:t>
-                    </a:r>
-                    <a:r>
-                      <a:rPr lang="en-US" sz="1400" b="1" dirty="0">
-                        <a:solidFill>
-                          <a:srgbClr val="0070C0"/>
-                        </a:solidFill>
-                      </a:rPr>
-                      <a:t>, </a:t>
-                    </a:r>
-                    <a14:m>
-                      <m:oMath xmlns:m="http://schemas.openxmlformats.org/officeDocument/2006/math">
-                        <m:r>
-                          <a:rPr lang="en-US" sz="1400" b="1">
-                            <a:latin typeface="Cambria Math"/>
-                            <a:ea typeface="Cambria Math"/>
-                          </a:rPr>
-                          <m:t>𝛈</m:t>
-                        </m:r>
-                        <m:r>
-                          <a:rPr lang="en-US" sz="1400" i="1" baseline="-25000">
-                            <a:latin typeface="Cambria Math"/>
-                            <a:ea typeface="Cambria Math"/>
-                          </a:rPr>
-                          <m:t>𝑘</m:t>
-                        </m:r>
-                        <m:r>
-                          <m:rPr>
-                            <m:sty m:val="p"/>
-                          </m:rPr>
-                          <a:rPr lang="en-US" sz="1400" baseline="30000">
-                            <a:latin typeface="Cambria Math"/>
-                            <a:ea typeface="Cambria Math"/>
-                          </a:rPr>
-                          <m:t>g</m:t>
-                        </m:r>
-                      </m:oMath>
-                    </a14:m>
-                    <a:r>
-                      <a:rPr lang="en-AU" sz="1400" baseline="-25000" dirty="0">
-                        <a:solidFill>
-                          <a:srgbClr val="0070C0"/>
-                        </a:solidFill>
-                      </a:rPr>
-                      <a:t> </a:t>
-                    </a:r>
-                    <a:r>
-                      <a:rPr lang="en-AU" sz="1400" dirty="0">
-                        <a:solidFill>
-                          <a:srgbClr val="0070C0"/>
-                        </a:solidFill>
-                      </a:rPr>
-                      <a:t>)</a:t>
-                    </a:r>
-                  </a:p>
-                </p:txBody>
-              </p:sp>
-            </mc:Choice>
-            <mc:Fallback>
-              <p:sp>
-                <p:nvSpPr>
-                  <p:cNvPr id="11" name="TextBox 10"/>
-                  <p:cNvSpPr txBox="1">
-                    <a:spLocks noRot="1" noChangeAspect="1" noMove="1" noResize="1" noEditPoints="1" noAdjustHandles="1" noChangeArrowheads="1" noChangeShapeType="1" noTextEdit="1"/>
-                  </p:cNvSpPr>
-                  <p:nvPr/>
-                </p:nvSpPr>
-                <p:spPr>
-                  <a:xfrm>
-                    <a:off x="206181" y="5021903"/>
-                    <a:ext cx="1781938" cy="954107"/>
-                  </a:xfrm>
-                  <a:prstGeom prst="rect">
-                    <a:avLst/>
-                  </a:prstGeom>
-                  <a:blipFill>
-                    <a:blip r:embed="rId5"/>
-                    <a:stretch>
-                      <a:fillRect l="-1210" t="-637" b="-5732"/>
-                    </a:stretch>
-                  </a:blipFill>
-                </p:spPr>
-                <p:txBody>
-                  <a:bodyPr/>
-                  <a:lstStyle/>
-                  <a:p>
-                    <a:r>
-                      <a:rPr lang="en-US">
-                        <a:noFill/>
-                      </a:rPr>
-                      <a:t> </a:t>
-                    </a:r>
-                  </a:p>
-                </p:txBody>
-              </p:sp>
-            </mc:Fallback>
-          </mc:AlternateContent>
-          <p:cxnSp>
-            <p:nvCxnSpPr>
-              <p:cNvPr id="13" name="Straight Arrow Connector 12"/>
-              <p:cNvCxnSpPr/>
-              <p:nvPr/>
-            </p:nvCxnSpPr>
-            <p:spPr>
-              <a:xfrm flipV="1">
-                <a:off x="206181" y="5538406"/>
-                <a:ext cx="1918448" cy="12554"/>
-              </a:xfrm>
-              <a:prstGeom prst="straightConnector1">
-                <a:avLst/>
-              </a:prstGeom>
-              <a:ln>
-                <a:tailEnd type="triangle"/>
-              </a:ln>
-            </p:spPr>
-            <p:style>
-              <a:lnRef idx="1">
-                <a:schemeClr val="accent1"/>
-              </a:lnRef>
-              <a:fillRef idx="0">
-                <a:schemeClr val="accent1"/>
-              </a:fillRef>
-              <a:effectRef idx="0">
-                <a:schemeClr val="accent1"/>
-              </a:effectRef>
-              <a:fontRef idx="minor">
-                <a:schemeClr val="tx1"/>
-              </a:fontRef>
-            </p:style>
-          </p:cxnSp>
-          <mc:AlternateContent xmlns:mc="http://schemas.openxmlformats.org/markup-compatibility/2006" xmlns:a14="http://schemas.microsoft.com/office/drawing/2010/main">
-            <mc:Choice Requires="a14">
-              <p:sp>
-                <p:nvSpPr>
-                  <p:cNvPr id="14" name="TextBox 13"/>
-                  <p:cNvSpPr txBox="1"/>
-                  <p:nvPr/>
-                </p:nvSpPr>
-                <p:spPr>
-                  <a:xfrm>
-                    <a:off x="2124629" y="5261043"/>
-                    <a:ext cx="1349190" cy="792000"/>
-                  </a:xfrm>
-                  <a:prstGeom prst="rect">
-                    <a:avLst/>
-                  </a:prstGeom>
-                  <a:noFill/>
-                  <a:ln>
-                    <a:solidFill>
-                      <a:schemeClr val="accent1">
-                        <a:shade val="50000"/>
-                      </a:schemeClr>
-                    </a:solidFill>
-                  </a:ln>
-                </p:spPr>
-                <p:txBody>
-                  <a:bodyPr wrap="square" rtlCol="0" anchor="ctr" anchorCtr="0">
                     <a:spAutoFit/>
                   </a:bodyPr>
                   <a:lstStyle/>
@@ -12609,23 +13484,264 @@
                         </m:oMathParaPr>
                         <m:oMath xmlns:m="http://schemas.openxmlformats.org/officeDocument/2006/math">
                           <m:r>
-                            <a:rPr lang="el-GR" i="1" smtClean="0">
+                            <m:rPr>
+                              <m:nor/>
+                            </m:rPr>
+                            <a:rPr lang="en-AU" sz="1200" dirty="0" smtClean="0">
+                              <a:latin typeface="Palace Script MT" pitchFamily="66" charset="0"/>
+                            </a:rPr>
+                            <m:t>N</m:t>
+                          </m:r>
+                          <m:r>
+                            <a:rPr lang="en-US" sz="1200" b="0" i="1" dirty="0" smtClean="0">
                               <a:latin typeface="Cambria Math"/>
                             </a:rPr>
-                            <m:t>⨋</m:t>
+                            <m:t>(</m:t>
+                          </m:r>
+                          <m:m>
+                            <m:mPr>
+                              <m:mcs>
+                                <m:mc>
+                                  <m:mcPr>
+                                    <m:count m:val="1"/>
+                                    <m:mcJc m:val="center"/>
+                                  </m:mcPr>
+                                </m:mc>
+                              </m:mcs>
+                              <m:ctrlPr>
+                                <a:rPr lang="en-US" sz="1200" i="1">
+                                  <a:latin typeface="Cambria Math" panose="02040503050406030204" pitchFamily="18" charset="0"/>
+                                </a:rPr>
+                              </m:ctrlPr>
+                            </m:mPr>
+                            <m:mr>
+                              <m:e>
+                                <m:r>
+                                  <a:rPr lang="en-AU" sz="1200" i="1">
+                                    <a:latin typeface="Cambria Math"/>
+                                    <a:ea typeface="Cambria Math"/>
+                                  </a:rPr>
+                                  <m:t>∆</m:t>
+                                </m:r>
+                                <m:sSub>
+                                  <m:sSubPr>
+                                    <m:ctrlPr>
+                                      <a:rPr lang="en-AU" sz="1200" i="1" smtClean="0">
+                                        <a:latin typeface="Cambria Math" panose="02040503050406030204" pitchFamily="18" charset="0"/>
+                                        <a:ea typeface="Cambria Math"/>
+                                      </a:rPr>
+                                    </m:ctrlPr>
+                                  </m:sSubPr>
+                                  <m:e>
+                                    <m:r>
+                                      <a:rPr lang="en-US" sz="1200" b="1" i="1" smtClean="0">
+                                        <a:latin typeface="Cambria Math" panose="02040503050406030204" pitchFamily="18" charset="0"/>
+                                        <a:ea typeface="Cambria Math"/>
+                                      </a:rPr>
+                                      <m:t>𝑨</m:t>
+                                    </m:r>
+                                  </m:e>
+                                  <m:sub>
+                                    <m:r>
+                                      <a:rPr lang="en-US" sz="1200" b="0" i="1" smtClean="0">
+                                        <a:latin typeface="Cambria Math"/>
+                                        <a:ea typeface="Cambria Math"/>
+                                      </a:rPr>
+                                      <m:t>𝑖</m:t>
+                                    </m:r>
+                                    <m:r>
+                                      <a:rPr lang="en-US" sz="1200" b="0" i="1" smtClean="0">
+                                        <a:latin typeface="Cambria Math"/>
+                                        <a:ea typeface="Cambria Math"/>
+                                      </a:rPr>
+                                      <m:t>,</m:t>
+                                    </m:r>
+                                    <m:r>
+                                      <a:rPr lang="en-US" sz="1200" b="0" i="1" smtClean="0">
+                                        <a:latin typeface="Cambria Math"/>
+                                        <a:ea typeface="Cambria Math"/>
+                                      </a:rPr>
+                                      <m:t>𝑘</m:t>
+                                    </m:r>
+                                    <m:r>
+                                      <a:rPr lang="en-US" sz="1200" b="0" i="1" smtClean="0">
+                                        <a:latin typeface="Cambria Math"/>
+                                        <a:ea typeface="Cambria Math"/>
+                                      </a:rPr>
+                                      <m:t>+1</m:t>
+                                    </m:r>
+                                  </m:sub>
+                                </m:sSub>
+                              </m:e>
+                            </m:mr>
+                            <m:mr>
+                              <m:e>
+                                <m:r>
+                                  <a:rPr lang="en-AU" sz="1200" i="1">
+                                    <a:latin typeface="Cambria Math"/>
+                                    <a:ea typeface="Cambria Math"/>
+                                  </a:rPr>
+                                  <m:t>∆</m:t>
+                                </m:r>
+                                <m:sSub>
+                                  <m:sSubPr>
+                                    <m:ctrlPr>
+                                      <a:rPr lang="en-AU" sz="1200" i="1">
+                                        <a:latin typeface="Cambria Math" panose="02040503050406030204" pitchFamily="18" charset="0"/>
+                                        <a:ea typeface="Cambria Math"/>
+                                      </a:rPr>
+                                    </m:ctrlPr>
+                                  </m:sSubPr>
+                                  <m:e>
+                                    <m:r>
+                                      <a:rPr lang="en-US" sz="1200" b="1" i="1" smtClean="0">
+                                        <a:latin typeface="Cambria Math"/>
+                                        <a:ea typeface="Cambria Math"/>
+                                      </a:rPr>
+                                      <m:t>𝒗</m:t>
+                                    </m:r>
+                                  </m:e>
+                                  <m:sub>
+                                    <m:r>
+                                      <a:rPr lang="en-US" sz="1200" b="0" i="1" smtClean="0">
+                                        <a:latin typeface="Cambria Math"/>
+                                        <a:ea typeface="Cambria Math"/>
+                                      </a:rPr>
+                                      <m:t>𝑖</m:t>
+                                    </m:r>
+                                    <m:r>
+                                      <a:rPr lang="en-US" sz="1200" b="0" i="1" smtClean="0">
+                                        <a:latin typeface="Cambria Math"/>
+                                        <a:ea typeface="Cambria Math"/>
+                                      </a:rPr>
+                                      <m:t>,</m:t>
+                                    </m:r>
+                                    <m:r>
+                                      <a:rPr lang="en-US" sz="1200" i="1">
+                                        <a:latin typeface="Cambria Math"/>
+                                        <a:ea typeface="Cambria Math"/>
+                                      </a:rPr>
+                                      <m:t>𝑘</m:t>
+                                    </m:r>
+                                    <m:r>
+                                      <a:rPr lang="en-US" sz="1200" i="1">
+                                        <a:latin typeface="Cambria Math"/>
+                                        <a:ea typeface="Cambria Math"/>
+                                      </a:rPr>
+                                      <m:t>+1</m:t>
+                                    </m:r>
+                                  </m:sub>
+                                </m:sSub>
+                              </m:e>
+                            </m:mr>
+                            <m:mr>
+                              <m:e>
+                                <m:r>
+                                  <a:rPr lang="en-AU" sz="1200" i="1">
+                                    <a:latin typeface="Cambria Math"/>
+                                    <a:ea typeface="Cambria Math"/>
+                                  </a:rPr>
+                                  <m:t>∆</m:t>
+                                </m:r>
+                                <m:sSubSup>
+                                  <m:sSubSupPr>
+                                    <m:ctrlPr>
+                                      <a:rPr lang="en-AU" sz="1200" i="1">
+                                        <a:latin typeface="Cambria Math" panose="02040503050406030204" pitchFamily="18" charset="0"/>
+                                      </a:rPr>
+                                    </m:ctrlPr>
+                                  </m:sSubSupPr>
+                                  <m:e>
+                                    <m:r>
+                                      <a:rPr lang="en-US" sz="1200" b="1" i="1">
+                                        <a:latin typeface="Cambria Math"/>
+                                      </a:rPr>
+                                      <m:t>𝒑</m:t>
+                                    </m:r>
+                                  </m:e>
+                                  <m:sub>
+                                    <m:r>
+                                      <a:rPr lang="en-US" sz="1200" b="0" i="1" smtClean="0">
+                                        <a:latin typeface="Cambria Math"/>
+                                      </a:rPr>
+                                      <m:t>𝑖</m:t>
+                                    </m:r>
+                                    <m:r>
+                                      <a:rPr lang="en-US" sz="1200" b="0" i="1" smtClean="0">
+                                        <a:latin typeface="Cambria Math"/>
+                                      </a:rPr>
+                                      <m:t>, </m:t>
+                                    </m:r>
+                                    <m:r>
+                                      <a:rPr lang="en-US" sz="1200" b="0" i="1" smtClean="0">
+                                        <a:latin typeface="Cambria Math"/>
+                                      </a:rPr>
+                                      <m:t>𝑘</m:t>
+                                    </m:r>
+                                    <m:r>
+                                      <a:rPr lang="en-US" sz="1200" b="0" i="1" smtClean="0">
+                                        <a:latin typeface="Cambria Math"/>
+                                      </a:rPr>
+                                      <m:t>+1</m:t>
+                                    </m:r>
+                                  </m:sub>
+                                  <m:sup>
+                                    <m:r>
+                                      <a:rPr lang="en-US" sz="1200" i="1">
+                                        <a:latin typeface="Cambria Math"/>
+                                      </a:rPr>
+                                      <m:t>+</m:t>
+                                    </m:r>
+                                  </m:sup>
+                                </m:sSubSup>
+                              </m:e>
+                            </m:mr>
+                          </m:m>
+                          <m:r>
+                            <a:rPr lang="en-US" sz="1200" b="0" i="1" smtClean="0">
+                              <a:latin typeface="Cambria Math"/>
+                            </a:rPr>
+                            <m:t>,</m:t>
+                          </m:r>
+                          <m:r>
+                            <m:rPr>
+                              <m:nor/>
+                            </m:rPr>
+                            <a:rPr lang="el-GR" sz="1200" dirty="0"/>
+                            <m:t>Σ</m:t>
+                          </m:r>
+                          <m:r>
+                            <m:rPr>
+                              <m:nor/>
+                            </m:rPr>
+                            <a:rPr lang="en-US" sz="1200" b="0" i="0" baseline="-25000" dirty="0" smtClean="0"/>
+                            <m:t>k</m:t>
+                          </m:r>
+                          <m:r>
+                            <m:rPr>
+                              <m:nor/>
+                            </m:rPr>
+                            <a:rPr lang="en-US" sz="1200" b="0" i="0" baseline="-25000" dirty="0" smtClean="0"/>
+                            <m:t>+1</m:t>
+                          </m:r>
+                          <m:r>
+                            <a:rPr lang="en-US" sz="1200" b="0" i="1" dirty="0" smtClean="0">
+                              <a:latin typeface="Cambria Math"/>
+                            </a:rPr>
+                            <m:t>)</m:t>
                           </m:r>
                         </m:oMath>
                       </m:oMathPara>
                     </a14:m>
-                    <a:endParaRPr lang="en-AU" dirty="0"/>
+                    <a:endParaRPr lang="en-AU" sz="1200" dirty="0"/>
                   </a:p>
                 </p:txBody>
               </p:sp>
             </mc:Choice>
-            <mc:Fallback xmlns="">
+            <mc:Fallback>
               <p:sp>
                 <p:nvSpPr>
-                  <p:cNvPr id="14" name="TextBox 13"/>
+                  <p:cNvPr id="1042" name="TextBox 1041"/>
                   <p:cNvSpPr txBox="1">
                     <a:spLocks noRot="1" noChangeAspect="1" noMove="1" noResize="1" noEditPoints="1" noAdjustHandles="1" noChangeArrowheads="1" noChangeShapeType="1" noTextEdit="1"/>
                   </p:cNvSpPr>
@@ -12633,25 +13749,18 @@
                 </p:nvSpPr>
                 <p:spPr>
                   <a:xfrm>
-                    <a:off x="2124629" y="5261043"/>
-                    <a:ext cx="1349190" cy="792000"/>
+                    <a:off x="4852102" y="5045987"/>
+                    <a:ext cx="1178937" cy="553346"/>
                   </a:xfrm>
                   <a:prstGeom prst="rect">
                     <a:avLst/>
                   </a:prstGeom>
-                  <a:blipFill rotWithShape="1">
-                    <a:blip r:embed="rId6"/>
+                  <a:blipFill rotWithShape="0">
+                    <a:blip r:embed="rId9"/>
                     <a:stretch>
                       <a:fillRect/>
                     </a:stretch>
                   </a:blipFill>
-                  <a:ln>
-                    <a:solidFill>
-                      <a:schemeClr val="accent1">
-                        <a:shade val="50000"/>
-                      </a:schemeClr>
-                    </a:solidFill>
-                  </a:ln>
                 </p:spPr>
                 <p:txBody>
                   <a:bodyPr/>
@@ -12668,520 +13777,80 @@
               </p:sp>
             </mc:Fallback>
           </mc:AlternateContent>
-          <p:cxnSp>
-            <p:nvCxnSpPr>
-              <p:cNvPr id="18" name="Straight Arrow Connector 17"/>
-              <p:cNvCxnSpPr/>
+          <p:sp>
+            <p:nvSpPr>
+              <p:cNvPr id="1043" name="TextBox 1042"/>
+              <p:cNvSpPr txBox="1"/>
               <p:nvPr/>
-            </p:nvCxnSpPr>
+            </p:nvSpPr>
             <p:spPr>
               <a:xfrm>
-                <a:off x="3491749" y="5558142"/>
-                <a:ext cx="1420903" cy="0"/>
+                <a:off x="2490189" y="6007708"/>
+                <a:ext cx="685316" cy="369332"/>
               </a:xfrm>
-              <a:prstGeom prst="straightConnector1">
+              <a:prstGeom prst="rect">
                 <a:avLst/>
               </a:prstGeom>
+              <a:grpFill/>
               <a:ln>
-                <a:tailEnd type="triangle"/>
+                <a:solidFill>
+                  <a:schemeClr val="accent1"/>
+                </a:solidFill>
               </a:ln>
             </p:spPr>
-            <p:style>
-              <a:lnRef idx="1">
-                <a:schemeClr val="accent1"/>
-              </a:lnRef>
-              <a:fillRef idx="0">
-                <a:schemeClr val="accent1"/>
-              </a:fillRef>
-              <a:effectRef idx="0">
-                <a:schemeClr val="accent1"/>
-              </a:effectRef>
-              <a:fontRef idx="minor">
-                <a:schemeClr val="tx1"/>
-              </a:fontRef>
-            </p:style>
-          </p:cxnSp>
-          <p:cxnSp>
-            <p:nvCxnSpPr>
-              <p:cNvPr id="20" name="Elbow Connector 19"/>
-              <p:cNvCxnSpPr/>
-              <p:nvPr/>
-            </p:nvCxnSpPr>
-            <p:spPr>
-              <a:xfrm rot="10800000" flipV="1">
-                <a:off x="3343830" y="5558141"/>
-                <a:ext cx="858372" cy="717153"/>
-              </a:xfrm>
-              <a:prstGeom prst="bentConnector3">
-                <a:avLst>
-                  <a:gd name="adj1" fmla="val 3003"/>
-                </a:avLst>
-              </a:prstGeom>
-              <a:ln>
-                <a:tailEnd type="arrow"/>
-              </a:ln>
-            </p:spPr>
-            <p:style>
-              <a:lnRef idx="1">
-                <a:schemeClr val="accent1"/>
-              </a:lnRef>
-              <a:fillRef idx="0">
-                <a:schemeClr val="accent1"/>
-              </a:fillRef>
-              <a:effectRef idx="0">
-                <a:schemeClr val="accent1"/>
-              </a:effectRef>
-              <a:fontRef idx="minor">
-                <a:schemeClr val="tx1"/>
-              </a:fontRef>
-            </p:style>
-          </p:cxnSp>
-          <p:cxnSp>
-            <p:nvCxnSpPr>
-              <p:cNvPr id="1032" name="Straight Arrow Connector 1031"/>
-              <p:cNvCxnSpPr/>
-              <p:nvPr/>
-            </p:nvCxnSpPr>
-            <p:spPr>
-              <a:xfrm flipV="1">
-                <a:off x="1568817" y="5818094"/>
-                <a:ext cx="555812" cy="6350"/>
-              </a:xfrm>
-              <a:prstGeom prst="straightConnector1">
-                <a:avLst/>
-              </a:prstGeom>
-              <a:ln>
-                <a:tailEnd type="arrow"/>
-              </a:ln>
-            </p:spPr>
-            <p:style>
-              <a:lnRef idx="1">
-                <a:schemeClr val="accent1"/>
-              </a:lnRef>
-              <a:fillRef idx="0">
-                <a:schemeClr val="accent1"/>
-              </a:fillRef>
-              <a:effectRef idx="0">
-                <a:schemeClr val="accent1"/>
-              </a:effectRef>
-              <a:fontRef idx="minor">
-                <a:schemeClr val="tx1"/>
-              </a:fontRef>
-            </p:style>
-          </p:cxnSp>
-          <p:cxnSp>
-            <p:nvCxnSpPr>
-              <p:cNvPr id="1035" name="Elbow Connector 1034"/>
-              <p:cNvCxnSpPr/>
-              <p:nvPr/>
-            </p:nvCxnSpPr>
-            <p:spPr>
-              <a:xfrm rot="5400000">
-                <a:off x="1340218" y="6053043"/>
-                <a:ext cx="457199" cy="1"/>
-              </a:xfrm>
-              <a:prstGeom prst="bentConnector3">
-                <a:avLst/>
-              </a:prstGeom>
-            </p:spPr>
-            <p:style>
-              <a:lnRef idx="1">
-                <a:schemeClr val="accent1"/>
-              </a:lnRef>
-              <a:fillRef idx="0">
-                <a:schemeClr val="accent1"/>
-              </a:fillRef>
-              <a:effectRef idx="0">
-                <a:schemeClr val="accent1"/>
-              </a:effectRef>
-              <a:fontRef idx="minor">
-                <a:schemeClr val="tx1"/>
-              </a:fontRef>
-            </p:style>
-          </p:cxnSp>
-          <p:cxnSp>
-            <p:nvCxnSpPr>
-              <p:cNvPr id="1039" name="Elbow Connector 1038"/>
-              <p:cNvCxnSpPr/>
-              <p:nvPr/>
-            </p:nvCxnSpPr>
-            <p:spPr>
-              <a:xfrm>
-                <a:off x="1568819" y="6275295"/>
-                <a:ext cx="1775011" cy="6348"/>
-              </a:xfrm>
-              <a:prstGeom prst="bentConnector3">
-                <a:avLst/>
-              </a:prstGeom>
-            </p:spPr>
-            <p:style>
-              <a:lnRef idx="1">
-                <a:schemeClr val="accent1"/>
-              </a:lnRef>
-              <a:fillRef idx="0">
-                <a:schemeClr val="accent1"/>
-              </a:fillRef>
-              <a:effectRef idx="0">
-                <a:schemeClr val="accent1"/>
-              </a:effectRef>
-              <a:fontRef idx="minor">
-                <a:schemeClr val="tx1"/>
-              </a:fontRef>
-            </p:style>
-          </p:cxnSp>
+            <p:txBody>
+              <a:bodyPr wrap="none" rtlCol="0">
+                <a:spAutoFit/>
+              </a:bodyPr>
+              <a:lstStyle/>
+              <a:p>
+                <a:r>
+                  <a:rPr lang="en-US" dirty="0"/>
+                  <a:t>delay</a:t>
+                </a:r>
+                <a:endParaRPr lang="en-AU" dirty="0"/>
+              </a:p>
+            </p:txBody>
+          </p:sp>
         </p:grpSp>
-        <mc:AlternateContent xmlns:mc="http://schemas.openxmlformats.org/markup-compatibility/2006">
-          <mc:Choice xmlns:a14="http://schemas.microsoft.com/office/drawing/2010/main" Requires="a14">
-            <p:sp>
-              <p:nvSpPr>
-                <p:cNvPr id="1042" name="TextBox 1041"/>
-                <p:cNvSpPr txBox="1"/>
-                <p:nvPr/>
-              </p:nvSpPr>
-              <p:spPr>
-                <a:xfrm>
-                  <a:off x="4267212" y="5051048"/>
-                  <a:ext cx="1739002" cy="999761"/>
-                </a:xfrm>
-                <a:prstGeom prst="rect">
-                  <a:avLst/>
-                </a:prstGeom>
-                <a:noFill/>
-              </p:spPr>
-              <p:txBody>
-                <a:bodyPr wrap="none" rtlCol="0">
-                  <a:spAutoFit/>
-                </a:bodyPr>
-                <a:lstStyle/>
-                <a:p>
-                  <a:pPr/>
-                  <a14:m>
-                    <m:oMathPara xmlns:m="http://schemas.openxmlformats.org/officeDocument/2006/math">
-                      <m:oMathParaPr>
-                        <m:jc m:val="centerGroup"/>
-                      </m:oMathParaPr>
-                      <m:oMath xmlns:m="http://schemas.openxmlformats.org/officeDocument/2006/math">
-                        <m:r>
-                          <m:rPr>
-                            <m:nor/>
-                          </m:rPr>
-                          <a:rPr lang="en-AU" dirty="0" smtClean="0">
-                            <a:latin typeface="Palace Script MT" pitchFamily="66" charset="0"/>
-                          </a:rPr>
-                          <m:t>N</m:t>
-                        </m:r>
-                        <m:r>
-                          <a:rPr lang="en-US" b="0" i="1" dirty="0" smtClean="0">
-                            <a:latin typeface="Cambria Math"/>
-                          </a:rPr>
-                          <m:t>(</m:t>
-                        </m:r>
-                        <m:m>
-                          <m:mPr>
-                            <m:mcs>
-                              <m:mc>
-                                <m:mcPr>
-                                  <m:count m:val="1"/>
-                                  <m:mcJc m:val="center"/>
-                                </m:mcPr>
-                              </m:mc>
-                            </m:mcs>
-                            <m:ctrlPr>
-                              <a:rPr lang="en-US" i="1">
-                                <a:latin typeface="Cambria Math" panose="02040503050406030204" pitchFamily="18" charset="0"/>
-                              </a:rPr>
-                            </m:ctrlPr>
-                          </m:mPr>
-                          <m:mr>
-                            <m:e>
-                              <m:r>
-                                <a:rPr lang="en-AU" i="1">
-                                  <a:latin typeface="Cambria Math"/>
-                                  <a:ea typeface="Cambria Math"/>
-                                </a:rPr>
-                                <m:t>∆</m:t>
-                              </m:r>
-                              <m:sSub>
-                                <m:sSubPr>
-                                  <m:ctrlPr>
-                                    <a:rPr lang="en-AU" i="1" smtClean="0">
-                                      <a:latin typeface="Cambria Math" panose="02040503050406030204" pitchFamily="18" charset="0"/>
-                                      <a:ea typeface="Cambria Math"/>
-                                    </a:rPr>
-                                  </m:ctrlPr>
-                                </m:sSubPr>
-                                <m:e>
-                                  <m:r>
-                                    <a:rPr lang="en-US" b="1" i="1" smtClean="0">
-                                      <a:latin typeface="Cambria Math" panose="02040503050406030204" pitchFamily="18" charset="0"/>
-                                      <a:ea typeface="Cambria Math"/>
-                                    </a:rPr>
-                                    <m:t>𝑨</m:t>
-                                  </m:r>
-                                </m:e>
-                                <m:sub>
-                                  <m:r>
-                                    <a:rPr lang="en-US" b="0" i="1" smtClean="0">
-                                      <a:latin typeface="Cambria Math"/>
-                                      <a:ea typeface="Cambria Math"/>
-                                    </a:rPr>
-                                    <m:t>𝑖</m:t>
-                                  </m:r>
-                                  <m:r>
-                                    <a:rPr lang="en-US" b="0" i="1" smtClean="0">
-                                      <a:latin typeface="Cambria Math"/>
-                                      <a:ea typeface="Cambria Math"/>
-                                    </a:rPr>
-                                    <m:t>,</m:t>
-                                  </m:r>
-                                  <m:r>
-                                    <a:rPr lang="en-US" b="0" i="1" smtClean="0">
-                                      <a:latin typeface="Cambria Math"/>
-                                      <a:ea typeface="Cambria Math"/>
-                                    </a:rPr>
-                                    <m:t>𝑘</m:t>
-                                  </m:r>
-                                  <m:r>
-                                    <a:rPr lang="en-US" b="0" i="1" smtClean="0">
-                                      <a:latin typeface="Cambria Math"/>
-                                      <a:ea typeface="Cambria Math"/>
-                                    </a:rPr>
-                                    <m:t>+1</m:t>
-                                  </m:r>
-                                </m:sub>
-                              </m:sSub>
-                            </m:e>
-                          </m:mr>
-                          <m:mr>
-                            <m:e>
-                              <m:r>
-                                <a:rPr lang="en-AU" i="1">
-                                  <a:latin typeface="Cambria Math"/>
-                                  <a:ea typeface="Cambria Math"/>
-                                </a:rPr>
-                                <m:t>∆</m:t>
-                              </m:r>
-                              <m:sSub>
-                                <m:sSubPr>
-                                  <m:ctrlPr>
-                                    <a:rPr lang="en-AU" i="1">
-                                      <a:latin typeface="Cambria Math" panose="02040503050406030204" pitchFamily="18" charset="0"/>
-                                      <a:ea typeface="Cambria Math"/>
-                                    </a:rPr>
-                                  </m:ctrlPr>
-                                </m:sSubPr>
-                                <m:e>
-                                  <m:r>
-                                    <a:rPr lang="en-US" b="1" i="1" smtClean="0">
-                                      <a:latin typeface="Cambria Math"/>
-                                      <a:ea typeface="Cambria Math"/>
-                                    </a:rPr>
-                                    <m:t>𝒗</m:t>
-                                  </m:r>
-                                </m:e>
-                                <m:sub>
-                                  <m:r>
-                                    <a:rPr lang="en-US" b="0" i="1" smtClean="0">
-                                      <a:latin typeface="Cambria Math"/>
-                                      <a:ea typeface="Cambria Math"/>
-                                    </a:rPr>
-                                    <m:t>𝑖</m:t>
-                                  </m:r>
-                                  <m:r>
-                                    <a:rPr lang="en-US" b="0" i="1" smtClean="0">
-                                      <a:latin typeface="Cambria Math"/>
-                                      <a:ea typeface="Cambria Math"/>
-                                    </a:rPr>
-                                    <m:t>,</m:t>
-                                  </m:r>
-                                  <m:r>
-                                    <a:rPr lang="en-US" i="1">
-                                      <a:latin typeface="Cambria Math"/>
-                                      <a:ea typeface="Cambria Math"/>
-                                    </a:rPr>
-                                    <m:t>𝑘</m:t>
-                                  </m:r>
-                                  <m:r>
-                                    <a:rPr lang="en-US" i="1">
-                                      <a:latin typeface="Cambria Math"/>
-                                      <a:ea typeface="Cambria Math"/>
-                                    </a:rPr>
-                                    <m:t>+1</m:t>
-                                  </m:r>
-                                </m:sub>
-                              </m:sSub>
-                            </m:e>
-                          </m:mr>
-                          <m:mr>
-                            <m:e>
-                              <m:r>
-                                <a:rPr lang="en-AU" i="1">
-                                  <a:latin typeface="Cambria Math"/>
-                                  <a:ea typeface="Cambria Math"/>
-                                </a:rPr>
-                                <m:t>∆</m:t>
-                              </m:r>
-                              <m:sSubSup>
-                                <m:sSubSupPr>
-                                  <m:ctrlPr>
-                                    <a:rPr lang="en-AU" i="1">
-                                      <a:latin typeface="Cambria Math" panose="02040503050406030204" pitchFamily="18" charset="0"/>
-                                    </a:rPr>
-                                  </m:ctrlPr>
-                                </m:sSubSupPr>
-                                <m:e>
-                                  <m:r>
-                                    <a:rPr lang="en-US" b="1" i="1">
-                                      <a:latin typeface="Cambria Math"/>
-                                    </a:rPr>
-                                    <m:t>𝒑</m:t>
-                                  </m:r>
-                                </m:e>
-                                <m:sub>
-                                  <m:r>
-                                    <a:rPr lang="en-US" b="0" i="1" smtClean="0">
-                                      <a:latin typeface="Cambria Math"/>
-                                    </a:rPr>
-                                    <m:t>𝑖</m:t>
-                                  </m:r>
-                                  <m:r>
-                                    <a:rPr lang="en-US" b="0" i="1" smtClean="0">
-                                      <a:latin typeface="Cambria Math"/>
-                                    </a:rPr>
-                                    <m:t>, </m:t>
-                                  </m:r>
-                                  <m:r>
-                                    <a:rPr lang="en-US" b="0" i="1" smtClean="0">
-                                      <a:latin typeface="Cambria Math"/>
-                                    </a:rPr>
-                                    <m:t>𝑘</m:t>
-                                  </m:r>
-                                  <m:r>
-                                    <a:rPr lang="en-US" b="0" i="1" smtClean="0">
-                                      <a:latin typeface="Cambria Math"/>
-                                    </a:rPr>
-                                    <m:t>+1</m:t>
-                                  </m:r>
-                                </m:sub>
-                                <m:sup>
-                                  <m:r>
-                                    <a:rPr lang="en-US" i="1">
-                                      <a:latin typeface="Cambria Math"/>
-                                    </a:rPr>
-                                    <m:t>+</m:t>
-                                  </m:r>
-                                </m:sup>
-                              </m:sSubSup>
-                            </m:e>
-                          </m:mr>
-                        </m:m>
-                        <m:r>
-                          <a:rPr lang="en-US" b="0" i="1" smtClean="0">
-                            <a:latin typeface="Cambria Math"/>
-                          </a:rPr>
-                          <m:t>,</m:t>
-                        </m:r>
-                        <m:r>
-                          <m:rPr>
-                            <m:nor/>
-                          </m:rPr>
-                          <a:rPr lang="el-GR" dirty="0"/>
-                          <m:t>Σ</m:t>
-                        </m:r>
-                        <m:r>
-                          <m:rPr>
-                            <m:nor/>
-                          </m:rPr>
-                          <a:rPr lang="en-US" b="0" i="0" baseline="-25000" dirty="0" smtClean="0"/>
-                          <m:t>k</m:t>
-                        </m:r>
-                        <m:r>
-                          <m:rPr>
-                            <m:nor/>
-                          </m:rPr>
-                          <a:rPr lang="en-US" b="0" i="0" baseline="-25000" dirty="0" smtClean="0"/>
-                          <m:t>+1</m:t>
-                        </m:r>
-                        <m:r>
-                          <a:rPr lang="en-US" b="0" i="1" dirty="0" smtClean="0">
-                            <a:latin typeface="Cambria Math"/>
-                          </a:rPr>
-                          <m:t>)</m:t>
-                        </m:r>
-                      </m:oMath>
-                    </m:oMathPara>
-                  </a14:m>
-                  <a:endParaRPr lang="en-AU" dirty="0"/>
-                </a:p>
-              </p:txBody>
-            </p:sp>
-          </mc:Choice>
-          <mc:Fallback>
-            <p:sp>
-              <p:nvSpPr>
-                <p:cNvPr id="1042" name="TextBox 1041"/>
-                <p:cNvSpPr txBox="1">
-                  <a:spLocks noRot="1" noChangeAspect="1" noMove="1" noResize="1" noEditPoints="1" noAdjustHandles="1" noChangeArrowheads="1" noChangeShapeType="1" noTextEdit="1"/>
-                </p:cNvSpPr>
-                <p:nvPr/>
-              </p:nvSpPr>
-              <p:spPr>
-                <a:xfrm>
-                  <a:off x="4267212" y="5051048"/>
-                  <a:ext cx="1739002" cy="999761"/>
-                </a:xfrm>
-                <a:prstGeom prst="rect">
-                  <a:avLst/>
-                </a:prstGeom>
-                <a:blipFill>
-                  <a:blip r:embed="rId7"/>
-                  <a:stretch>
-                    <a:fillRect/>
-                  </a:stretch>
-                </a:blipFill>
-              </p:spPr>
-              <p:txBody>
-                <a:bodyPr/>
-                <a:lstStyle/>
-                <a:p>
-                  <a:r>
-                    <a:rPr lang="en-US">
-                      <a:noFill/>
-                    </a:rPr>
-                    <a:t> </a:t>
-                  </a:r>
-                </a:p>
-              </p:txBody>
-            </p:sp>
-          </mc:Fallback>
-        </mc:AlternateContent>
         <p:sp>
           <p:nvSpPr>
-            <p:cNvPr id="1043" name="TextBox 1042"/>
-            <p:cNvSpPr txBox="1"/>
+            <p:cNvPr id="6" name="Rectangle 5"/>
+            <p:cNvSpPr/>
             <p:nvPr/>
           </p:nvSpPr>
           <p:spPr>
             <a:xfrm>
-              <a:off x="2259106" y="6302189"/>
-              <a:ext cx="685316" cy="369332"/>
+              <a:off x="1908810" y="4565162"/>
+              <a:ext cx="2105698" cy="1154063"/>
             </a:xfrm>
             <a:prstGeom prst="rect">
               <a:avLst/>
             </a:prstGeom>
             <a:noFill/>
           </p:spPr>
+          <p:style>
+            <a:lnRef idx="2">
+              <a:schemeClr val="accent1">
+                <a:shade val="50000"/>
+              </a:schemeClr>
+            </a:lnRef>
+            <a:fillRef idx="1">
+              <a:schemeClr val="accent1"/>
+            </a:fillRef>
+            <a:effectRef idx="0">
+              <a:schemeClr val="accent1"/>
+            </a:effectRef>
+            <a:fontRef idx="minor">
+              <a:schemeClr val="lt1"/>
+            </a:fontRef>
+          </p:style>
           <p:txBody>
-            <a:bodyPr wrap="none" rtlCol="0">
-              <a:spAutoFit/>
-            </a:bodyPr>
+            <a:bodyPr rtlCol="0" anchor="ctr"/>
             <a:lstStyle/>
             <a:p>
-              <a:r>
-                <a:rPr lang="en-US" dirty="0"/>
-                <a:t>delay</a:t>
-              </a:r>
-              <a:endParaRPr lang="en-AU" dirty="0"/>
+              <a:pPr algn="ctr"/>
+              <a:endParaRPr lang="en-AU"/>
             </a:p>
           </p:txBody>
         </p:sp>
@@ -19282,28 +19951,28 @@
                 <a:gridCol w="678596">
                   <a:extLst>
                     <a:ext uri="{9D8B030D-6E8A-4147-A177-3AD203B41FA5}">
-                      <a16:colId xmlns:a16="http://schemas.microsoft.com/office/drawing/2014/main" val="1969681677"/>
+                      <a16:colId xmlns:a16="http://schemas.microsoft.com/office/drawing/2014/main" xmlns="" val="1969681677"/>
                     </a:ext>
                   </a:extLst>
                 </a:gridCol>
                 <a:gridCol w="1577017">
                   <a:extLst>
                     <a:ext uri="{9D8B030D-6E8A-4147-A177-3AD203B41FA5}">
-                      <a16:colId xmlns:a16="http://schemas.microsoft.com/office/drawing/2014/main" val="4015357166"/>
+                      <a16:colId xmlns:a16="http://schemas.microsoft.com/office/drawing/2014/main" xmlns="" val="4015357166"/>
                     </a:ext>
                   </a:extLst>
                 </a:gridCol>
                 <a:gridCol w="1720382">
                   <a:extLst>
                     <a:ext uri="{9D8B030D-6E8A-4147-A177-3AD203B41FA5}">
-                      <a16:colId xmlns:a16="http://schemas.microsoft.com/office/drawing/2014/main" val="1617265938"/>
+                      <a16:colId xmlns:a16="http://schemas.microsoft.com/office/drawing/2014/main" xmlns="" val="1617265938"/>
                     </a:ext>
                   </a:extLst>
                 </a:gridCol>
                 <a:gridCol w="1596131">
                   <a:extLst>
                     <a:ext uri="{9D8B030D-6E8A-4147-A177-3AD203B41FA5}">
-                      <a16:colId xmlns:a16="http://schemas.microsoft.com/office/drawing/2014/main" val="1307686583"/>
+                      <a16:colId xmlns:a16="http://schemas.microsoft.com/office/drawing/2014/main" xmlns="" val="1307686583"/>
                     </a:ext>
                   </a:extLst>
                 </a:gridCol>
@@ -19358,7 +20027,7 @@
                 </a:tc>
                 <a:extLst>
                   <a:ext uri="{0D108BD9-81ED-4DB2-BD59-A6C34878D82A}">
-                    <a16:rowId xmlns:a16="http://schemas.microsoft.com/office/drawing/2014/main" val="758164643"/>
+                    <a16:rowId xmlns:a16="http://schemas.microsoft.com/office/drawing/2014/main" xmlns="" val="758164643"/>
                   </a:ext>
                 </a:extLst>
               </a:tr>
@@ -19453,7 +20122,7 @@
                 </a:tc>
                 <a:extLst>
                   <a:ext uri="{0D108BD9-81ED-4DB2-BD59-A6C34878D82A}">
-                    <a16:rowId xmlns:a16="http://schemas.microsoft.com/office/drawing/2014/main" val="3932375478"/>
+                    <a16:rowId xmlns:a16="http://schemas.microsoft.com/office/drawing/2014/main" xmlns="" val="3932375478"/>
                   </a:ext>
                 </a:extLst>
               </a:tr>
@@ -19530,7 +20199,7 @@
                 </a:tc>
                 <a:extLst>
                   <a:ext uri="{0D108BD9-81ED-4DB2-BD59-A6C34878D82A}">
-                    <a16:rowId xmlns:a16="http://schemas.microsoft.com/office/drawing/2014/main" val="3737485163"/>
+                    <a16:rowId xmlns:a16="http://schemas.microsoft.com/office/drawing/2014/main" xmlns="" val="3737485163"/>
                   </a:ext>
                 </a:extLst>
               </a:tr>
@@ -19653,7 +20322,7 @@
                 </a:tc>
                 <a:extLst>
                   <a:ext uri="{0D108BD9-81ED-4DB2-BD59-A6C34878D82A}">
-                    <a16:rowId xmlns:a16="http://schemas.microsoft.com/office/drawing/2014/main" val="4236481450"/>
+                    <a16:rowId xmlns:a16="http://schemas.microsoft.com/office/drawing/2014/main" xmlns="" val="4236481450"/>
                   </a:ext>
                 </a:extLst>
               </a:tr>
@@ -19768,7 +20437,7 @@
                 </a:tc>
                 <a:extLst>
                   <a:ext uri="{0D108BD9-81ED-4DB2-BD59-A6C34878D82A}">
-                    <a16:rowId xmlns:a16="http://schemas.microsoft.com/office/drawing/2014/main" val="3335519353"/>
+                    <a16:rowId xmlns:a16="http://schemas.microsoft.com/office/drawing/2014/main" xmlns="" val="3335519353"/>
                   </a:ext>
                 </a:extLst>
               </a:tr>
@@ -19857,7 +20526,7 @@
                 </a:tc>
                 <a:extLst>
                   <a:ext uri="{0D108BD9-81ED-4DB2-BD59-A6C34878D82A}">
-                    <a16:rowId xmlns:a16="http://schemas.microsoft.com/office/drawing/2014/main" val="1954581546"/>
+                    <a16:rowId xmlns:a16="http://schemas.microsoft.com/office/drawing/2014/main" xmlns="" val="1954581546"/>
                   </a:ext>
                 </a:extLst>
               </a:tr>
@@ -19990,7 +20659,7 @@
                 </a:tc>
                 <a:extLst>
                   <a:ext uri="{0D108BD9-81ED-4DB2-BD59-A6C34878D82A}">
-                    <a16:rowId xmlns:a16="http://schemas.microsoft.com/office/drawing/2014/main" val="3035050982"/>
+                    <a16:rowId xmlns:a16="http://schemas.microsoft.com/office/drawing/2014/main" xmlns="" val="3035050982"/>
                   </a:ext>
                 </a:extLst>
               </a:tr>
@@ -20122,7 +20791,7 @@
                 </a:tc>
                 <a:extLst>
                   <a:ext uri="{0D108BD9-81ED-4DB2-BD59-A6C34878D82A}">
-                    <a16:rowId xmlns:a16="http://schemas.microsoft.com/office/drawing/2014/main" val="2046055926"/>
+                    <a16:rowId xmlns:a16="http://schemas.microsoft.com/office/drawing/2014/main" xmlns="" val="2046055926"/>
                   </a:ext>
                 </a:extLst>
               </a:tr>
@@ -20199,7 +20868,7 @@
                 </a:tc>
                 <a:extLst>
                   <a:ext uri="{0D108BD9-81ED-4DB2-BD59-A6C34878D82A}">
-                    <a16:rowId xmlns:a16="http://schemas.microsoft.com/office/drawing/2014/main" val="2033872525"/>
+                    <a16:rowId xmlns:a16="http://schemas.microsoft.com/office/drawing/2014/main" xmlns="" val="2033872525"/>
                   </a:ext>
                 </a:extLst>
               </a:tr>
@@ -20319,7 +20988,7 @@
                 </a:tc>
                 <a:extLst>
                   <a:ext uri="{0D108BD9-81ED-4DB2-BD59-A6C34878D82A}">
-                    <a16:rowId xmlns:a16="http://schemas.microsoft.com/office/drawing/2014/main" val="1312604833"/>
+                    <a16:rowId xmlns:a16="http://schemas.microsoft.com/office/drawing/2014/main" xmlns="" val="1312604833"/>
                   </a:ext>
                 </a:extLst>
               </a:tr>

</xml_diff>

<commit_message>
more fix to tex
</commit_message>
<xml_diff>
--- a/doc/Efficient Visual-Inertial Navigation using Euler angles.pptx
+++ b/doc/Efficient Visual-Inertial Navigation using Euler angles.pptx
@@ -4153,7 +4153,7 @@
                     <a:t>bias </a:t>
                   </a:r>
                   <a:r>
-                    <a:rPr lang="en-US" sz="1400" b="1" dirty="0">
+                    <a:rPr lang="en-US" sz="1400" b="1" dirty="0" smtClean="0">
                       <a:solidFill>
                         <a:srgbClr val="0070C0"/>
                       </a:solidFill>
@@ -4161,12 +4161,12 @@
                     <a:t>b</a:t>
                   </a:r>
                   <a:r>
-                    <a:rPr lang="el-GR" sz="1400" b="1" baseline="30000" dirty="0">
+                    <a:rPr lang="en-AU" sz="1400" b="1" baseline="30000" smtClean="0">
                       <a:solidFill>
                         <a:srgbClr val="0070C0"/>
                       </a:solidFill>
                     </a:rPr>
-                    <a:t>ω</a:t>
+                    <a:t>f</a:t>
                   </a:r>
                   <a:endParaRPr lang="en-AU" sz="1400" b="1" dirty="0">
                     <a:solidFill>
@@ -12292,8 +12292,8 @@
             <a:chExt cx="5762098" cy="2302975"/>
           </a:xfrm>
         </p:grpSpPr>
-        <mc:AlternateContent xmlns:mc="http://schemas.openxmlformats.org/markup-compatibility/2006">
-          <mc:Choice xmlns:a14="http://schemas.microsoft.com/office/drawing/2010/main" Requires="a14">
+        <mc:AlternateContent xmlns:mc="http://schemas.openxmlformats.org/markup-compatibility/2006" xmlns:a14="http://schemas.microsoft.com/office/drawing/2010/main">
+          <mc:Choice Requires="a14">
             <p:sp>
               <p:nvSpPr>
                 <p:cNvPr id="5" name="TextBox 4"/>
@@ -12316,6 +12316,7 @@
                 </a:bodyPr>
                 <a:lstStyle/>
                 <a:p>
+                  <a:pPr/>
                   <a14:m>
                     <m:oMathPara xmlns:m="http://schemas.openxmlformats.org/officeDocument/2006/math">
                       <m:oMathParaPr>
@@ -12336,7 +12337,7 @@
               </p:txBody>
             </p:sp>
           </mc:Choice>
-          <mc:Fallback>
+          <mc:Fallback xmlns="">
             <p:sp>
               <p:nvSpPr>
                 <p:cNvPr id="5" name="TextBox 4"/>
@@ -12375,8 +12376,8 @@
             </p:sp>
           </mc:Fallback>
         </mc:AlternateContent>
-        <mc:AlternateContent xmlns:mc="http://schemas.openxmlformats.org/markup-compatibility/2006">
-          <mc:Choice xmlns:a14="http://schemas.microsoft.com/office/drawing/2010/main" Requires="a14">
+        <mc:AlternateContent xmlns:mc="http://schemas.openxmlformats.org/markup-compatibility/2006" xmlns:a14="http://schemas.microsoft.com/office/drawing/2010/main">
+          <mc:Choice Requires="a14">
             <p:sp>
               <p:nvSpPr>
                 <p:cNvPr id="21" name="TextBox 20"/>
@@ -12634,7 +12635,7 @@
               </p:txBody>
             </p:sp>
           </mc:Choice>
-          <mc:Fallback>
+          <mc:Fallback xmlns="">
             <p:sp>
               <p:nvSpPr>
                 <p:cNvPr id="21" name="TextBox 20"/>
@@ -12735,8 +12736,8 @@
               </a:xfrm>
               <a:grpFill/>
             </p:grpSpPr>
-            <mc:AlternateContent xmlns:mc="http://schemas.openxmlformats.org/markup-compatibility/2006">
-              <mc:Choice xmlns:a14="http://schemas.microsoft.com/office/drawing/2010/main" Requires="a14">
+            <mc:AlternateContent xmlns:mc="http://schemas.openxmlformats.org/markup-compatibility/2006" xmlns:a14="http://schemas.microsoft.com/office/drawing/2010/main">
+              <mc:Choice Requires="a14">
                 <p:sp>
                   <p:nvSpPr>
                     <p:cNvPr id="11" name="TextBox 10"/>
@@ -13002,7 +13003,7 @@
                   </p:txBody>
                 </p:sp>
               </mc:Choice>
-              <mc:Fallback>
+              <mc:Fallback xmlns="">
                 <p:sp>
                   <p:nvSpPr>
                     <p:cNvPr id="11" name="TextBox 10"/>
@@ -13041,8 +13042,8 @@
                 </p:sp>
               </mc:Fallback>
             </mc:AlternateContent>
-            <mc:AlternateContent xmlns:mc="http://schemas.openxmlformats.org/markup-compatibility/2006">
-              <mc:Choice xmlns:a14="http://schemas.microsoft.com/office/drawing/2010/main" Requires="a14">
+            <mc:AlternateContent xmlns:mc="http://schemas.openxmlformats.org/markup-compatibility/2006" xmlns:a14="http://schemas.microsoft.com/office/drawing/2010/main">
+              <mc:Choice Requires="a14">
                 <p:sp>
                   <p:nvSpPr>
                     <p:cNvPr id="14" name="TextBox 13"/>
@@ -13209,7 +13210,7 @@
                   </p:txBody>
                 </p:sp>
               </mc:Choice>
-              <mc:Fallback>
+              <mc:Fallback xmlns="">
                 <p:sp>
                   <p:nvSpPr>
                     <p:cNvPr id="14" name="TextBox 13"/>
@@ -13452,8 +13453,8 @@
               </p:style>
             </p:cxnSp>
           </p:grpSp>
-          <mc:AlternateContent xmlns:mc="http://schemas.openxmlformats.org/markup-compatibility/2006">
-            <mc:Choice xmlns:a14="http://schemas.microsoft.com/office/drawing/2010/main" Requires="a14">
+          <mc:AlternateContent xmlns:mc="http://schemas.openxmlformats.org/markup-compatibility/2006" xmlns:a14="http://schemas.microsoft.com/office/drawing/2010/main">
+            <mc:Choice Requires="a14">
               <p:sp>
                 <p:nvSpPr>
                   <p:cNvPr id="1042" name="TextBox 1041"/>
@@ -13738,7 +13739,7 @@
                 </p:txBody>
               </p:sp>
             </mc:Choice>
-            <mc:Fallback>
+            <mc:Fallback xmlns="">
               <p:sp>
                 <p:nvSpPr>
                   <p:cNvPr id="1042" name="TextBox 1041"/>
@@ -19951,28 +19952,28 @@
                 <a:gridCol w="678596">
                   <a:extLst>
                     <a:ext uri="{9D8B030D-6E8A-4147-A177-3AD203B41FA5}">
-                      <a16:colId xmlns:a16="http://schemas.microsoft.com/office/drawing/2014/main" xmlns="" val="1969681677"/>
+                      <a16:colId xmlns="" xmlns:a16="http://schemas.microsoft.com/office/drawing/2014/main" val="1969681677"/>
                     </a:ext>
                   </a:extLst>
                 </a:gridCol>
                 <a:gridCol w="1577017">
                   <a:extLst>
                     <a:ext uri="{9D8B030D-6E8A-4147-A177-3AD203B41FA5}">
-                      <a16:colId xmlns:a16="http://schemas.microsoft.com/office/drawing/2014/main" xmlns="" val="4015357166"/>
+                      <a16:colId xmlns="" xmlns:a16="http://schemas.microsoft.com/office/drawing/2014/main" val="4015357166"/>
                     </a:ext>
                   </a:extLst>
                 </a:gridCol>
                 <a:gridCol w="1720382">
                   <a:extLst>
                     <a:ext uri="{9D8B030D-6E8A-4147-A177-3AD203B41FA5}">
-                      <a16:colId xmlns:a16="http://schemas.microsoft.com/office/drawing/2014/main" xmlns="" val="1617265938"/>
+                      <a16:colId xmlns="" xmlns:a16="http://schemas.microsoft.com/office/drawing/2014/main" val="1617265938"/>
                     </a:ext>
                   </a:extLst>
                 </a:gridCol>
                 <a:gridCol w="1596131">
                   <a:extLst>
                     <a:ext uri="{9D8B030D-6E8A-4147-A177-3AD203B41FA5}">
-                      <a16:colId xmlns:a16="http://schemas.microsoft.com/office/drawing/2014/main" xmlns="" val="1307686583"/>
+                      <a16:colId xmlns="" xmlns:a16="http://schemas.microsoft.com/office/drawing/2014/main" val="1307686583"/>
                     </a:ext>
                   </a:extLst>
                 </a:gridCol>
@@ -20027,7 +20028,7 @@
                 </a:tc>
                 <a:extLst>
                   <a:ext uri="{0D108BD9-81ED-4DB2-BD59-A6C34878D82A}">
-                    <a16:rowId xmlns:a16="http://schemas.microsoft.com/office/drawing/2014/main" xmlns="" val="758164643"/>
+                    <a16:rowId xmlns="" xmlns:a16="http://schemas.microsoft.com/office/drawing/2014/main" val="758164643"/>
                   </a:ext>
                 </a:extLst>
               </a:tr>
@@ -20122,7 +20123,7 @@
                 </a:tc>
                 <a:extLst>
                   <a:ext uri="{0D108BD9-81ED-4DB2-BD59-A6C34878D82A}">
-                    <a16:rowId xmlns:a16="http://schemas.microsoft.com/office/drawing/2014/main" xmlns="" val="3932375478"/>
+                    <a16:rowId xmlns="" xmlns:a16="http://schemas.microsoft.com/office/drawing/2014/main" val="3932375478"/>
                   </a:ext>
                 </a:extLst>
               </a:tr>
@@ -20199,7 +20200,7 @@
                 </a:tc>
                 <a:extLst>
                   <a:ext uri="{0D108BD9-81ED-4DB2-BD59-A6C34878D82A}">
-                    <a16:rowId xmlns:a16="http://schemas.microsoft.com/office/drawing/2014/main" xmlns="" val="3737485163"/>
+                    <a16:rowId xmlns="" xmlns:a16="http://schemas.microsoft.com/office/drawing/2014/main" val="3737485163"/>
                   </a:ext>
                 </a:extLst>
               </a:tr>
@@ -20322,7 +20323,7 @@
                 </a:tc>
                 <a:extLst>
                   <a:ext uri="{0D108BD9-81ED-4DB2-BD59-A6C34878D82A}">
-                    <a16:rowId xmlns:a16="http://schemas.microsoft.com/office/drawing/2014/main" xmlns="" val="4236481450"/>
+                    <a16:rowId xmlns="" xmlns:a16="http://schemas.microsoft.com/office/drawing/2014/main" val="4236481450"/>
                   </a:ext>
                 </a:extLst>
               </a:tr>
@@ -20437,7 +20438,7 @@
                 </a:tc>
                 <a:extLst>
                   <a:ext uri="{0D108BD9-81ED-4DB2-BD59-A6C34878D82A}">
-                    <a16:rowId xmlns:a16="http://schemas.microsoft.com/office/drawing/2014/main" xmlns="" val="3335519353"/>
+                    <a16:rowId xmlns="" xmlns:a16="http://schemas.microsoft.com/office/drawing/2014/main" val="3335519353"/>
                   </a:ext>
                 </a:extLst>
               </a:tr>
@@ -20526,7 +20527,7 @@
                 </a:tc>
                 <a:extLst>
                   <a:ext uri="{0D108BD9-81ED-4DB2-BD59-A6C34878D82A}">
-                    <a16:rowId xmlns:a16="http://schemas.microsoft.com/office/drawing/2014/main" xmlns="" val="1954581546"/>
+                    <a16:rowId xmlns="" xmlns:a16="http://schemas.microsoft.com/office/drawing/2014/main" val="1954581546"/>
                   </a:ext>
                 </a:extLst>
               </a:tr>
@@ -20659,7 +20660,7 @@
                 </a:tc>
                 <a:extLst>
                   <a:ext uri="{0D108BD9-81ED-4DB2-BD59-A6C34878D82A}">
-                    <a16:rowId xmlns:a16="http://schemas.microsoft.com/office/drawing/2014/main" xmlns="" val="3035050982"/>
+                    <a16:rowId xmlns="" xmlns:a16="http://schemas.microsoft.com/office/drawing/2014/main" val="3035050982"/>
                   </a:ext>
                 </a:extLst>
               </a:tr>
@@ -20791,7 +20792,7 @@
                 </a:tc>
                 <a:extLst>
                   <a:ext uri="{0D108BD9-81ED-4DB2-BD59-A6C34878D82A}">
-                    <a16:rowId xmlns:a16="http://schemas.microsoft.com/office/drawing/2014/main" xmlns="" val="2046055926"/>
+                    <a16:rowId xmlns="" xmlns:a16="http://schemas.microsoft.com/office/drawing/2014/main" val="2046055926"/>
                   </a:ext>
                 </a:extLst>
               </a:tr>
@@ -20868,7 +20869,7 @@
                 </a:tc>
                 <a:extLst>
                   <a:ext uri="{0D108BD9-81ED-4DB2-BD59-A6C34878D82A}">
-                    <a16:rowId xmlns:a16="http://schemas.microsoft.com/office/drawing/2014/main" xmlns="" val="2033872525"/>
+                    <a16:rowId xmlns="" xmlns:a16="http://schemas.microsoft.com/office/drawing/2014/main" val="2033872525"/>
                   </a:ext>
                 </a:extLst>
               </a:tr>
@@ -20988,7 +20989,7 @@
                 </a:tc>
                 <a:extLst>
                   <a:ext uri="{0D108BD9-81ED-4DB2-BD59-A6C34878D82A}">
-                    <a16:rowId xmlns:a16="http://schemas.microsoft.com/office/drawing/2014/main" xmlns="" val="1312604833"/>
+                    <a16:rowId xmlns="" xmlns:a16="http://schemas.microsoft.com/office/drawing/2014/main" val="1312604833"/>
                   </a:ext>
                 </a:extLst>
               </a:tr>

</xml_diff>

<commit_message>
More tex typo fix after presentation
</commit_message>
<xml_diff>
--- a/doc/Efficient Visual-Inertial Navigation using Euler angles.pptx
+++ b/doc/Efficient Visual-Inertial Navigation using Euler angles.pptx
@@ -12286,14 +12286,14 @@
         </p:nvGrpSpPr>
         <p:grpSpPr>
           <a:xfrm>
-            <a:off x="233081" y="4048207"/>
-            <a:ext cx="5762098" cy="2302975"/>
-            <a:chOff x="233081" y="4048207"/>
-            <a:chExt cx="5762098" cy="2302975"/>
+            <a:off x="146100" y="4048208"/>
+            <a:ext cx="5752573" cy="2243800"/>
+            <a:chOff x="108000" y="4048208"/>
+            <a:chExt cx="5752573" cy="2243800"/>
           </a:xfrm>
         </p:grpSpPr>
-        <mc:AlternateContent xmlns:mc="http://schemas.openxmlformats.org/markup-compatibility/2006" xmlns:a14="http://schemas.microsoft.com/office/drawing/2010/main">
-          <mc:Choice Requires="a14">
+        <mc:AlternateContent xmlns:mc="http://schemas.openxmlformats.org/markup-compatibility/2006">
+          <mc:Choice xmlns:a14="http://schemas.microsoft.com/office/drawing/2010/main" Requires="a14">
             <p:sp>
               <p:nvSpPr>
                 <p:cNvPr id="5" name="TextBox 4"/>
@@ -12302,7 +12302,7 @@
               </p:nvSpPr>
               <p:spPr>
                 <a:xfrm>
-                  <a:off x="2411813" y="5222232"/>
+                  <a:off x="2644881" y="5151736"/>
                   <a:ext cx="465789" cy="419538"/>
                 </a:xfrm>
                 <a:prstGeom prst="rect">
@@ -12337,7 +12337,7 @@
               </p:txBody>
             </p:sp>
           </mc:Choice>
-          <mc:Fallback xmlns="">
+          <mc:Fallback>
             <p:sp>
               <p:nvSpPr>
                 <p:cNvPr id="5" name="TextBox 4"/>
@@ -12348,7 +12348,7 @@
               </p:nvSpPr>
               <p:spPr>
                 <a:xfrm>
-                  <a:off x="2411813" y="5222232"/>
+                  <a:off x="2644881" y="5151736"/>
                   <a:ext cx="465789" cy="419538"/>
                 </a:xfrm>
                 <a:prstGeom prst="rect">
@@ -12357,7 +12357,7 @@
                 <a:blipFill rotWithShape="0">
                   <a:blip r:embed="rId5"/>
                   <a:stretch>
-                    <a:fillRect t="-2941" r="-1316" b="-25000"/>
+                    <a:fillRect t="-1449" b="-24638"/>
                   </a:stretch>
                 </a:blipFill>
               </p:spPr>
@@ -12376,8 +12376,8 @@
             </p:sp>
           </mc:Fallback>
         </mc:AlternateContent>
-        <mc:AlternateContent xmlns:mc="http://schemas.openxmlformats.org/markup-compatibility/2006" xmlns:a14="http://schemas.microsoft.com/office/drawing/2010/main">
-          <mc:Choice Requires="a14">
+        <mc:AlternateContent xmlns:mc="http://schemas.openxmlformats.org/markup-compatibility/2006">
+          <mc:Choice xmlns:a14="http://schemas.microsoft.com/office/drawing/2010/main" Requires="a14">
             <p:sp>
               <p:nvSpPr>
                 <p:cNvPr id="21" name="TextBox 20"/>
@@ -12386,8 +12386,8 @@
               </p:nvSpPr>
               <p:spPr>
                 <a:xfrm>
-                  <a:off x="267496" y="5480189"/>
-                  <a:ext cx="1263244" cy="695319"/>
+                  <a:off x="327025" y="5596689"/>
+                  <a:ext cx="882650" cy="695319"/>
                 </a:xfrm>
                 <a:prstGeom prst="rect">
                   <a:avLst/>
@@ -12395,7 +12395,7 @@
                 <a:noFill/>
               </p:spPr>
               <p:txBody>
-                <a:bodyPr wrap="square" rtlCol="0">
+                <a:bodyPr wrap="square" lIns="36000" tIns="36000" rIns="36000" bIns="36000" rtlCol="0">
                   <a:spAutoFit/>
                 </a:bodyPr>
                 <a:lstStyle/>
@@ -12411,7 +12411,7 @@
                           <m:rPr>
                             <m:nor/>
                           </m:rPr>
-                          <a:rPr lang="en-AU" sz="1200" dirty="0" smtClean="0">
+                          <a:rPr lang="en-AU" sz="1200" b="1" dirty="0" smtClean="0">
                             <a:latin typeface="Palace Script MT" pitchFamily="66" charset="0"/>
                           </a:rPr>
                           <m:t>N</m:t>
@@ -12635,7 +12635,7 @@
               </p:txBody>
             </p:sp>
           </mc:Choice>
-          <mc:Fallback xmlns="">
+          <mc:Fallback>
             <p:sp>
               <p:nvSpPr>
                 <p:cNvPr id="21" name="TextBox 20"/>
@@ -12646,8 +12646,8 @@
               </p:nvSpPr>
               <p:spPr>
                 <a:xfrm>
-                  <a:off x="267496" y="5480189"/>
-                  <a:ext cx="1263244" cy="695319"/>
+                  <a:off x="327025" y="5596689"/>
+                  <a:ext cx="882650" cy="695319"/>
                 </a:xfrm>
                 <a:prstGeom prst="rect">
                   <a:avLst/>
@@ -12682,10 +12682,10 @@
           </p:nvGrpSpPr>
           <p:grpSpPr>
             <a:xfrm>
-              <a:off x="233081" y="4048207"/>
-              <a:ext cx="5762098" cy="2302975"/>
-              <a:chOff x="268941" y="4544294"/>
-              <a:chExt cx="5762098" cy="1832746"/>
+              <a:off x="108000" y="4048208"/>
+              <a:ext cx="5752573" cy="2188586"/>
+              <a:chOff x="143860" y="4544294"/>
+              <a:chExt cx="5752573" cy="1741713"/>
             </a:xfrm>
             <a:solidFill>
               <a:schemeClr val="bg1"/>
@@ -12700,7 +12700,7 @@
             <p:spPr>
               <a:xfrm>
                 <a:off x="1129931" y="4544294"/>
-                <a:ext cx="3469398" cy="369332"/>
+                <a:ext cx="3469398" cy="237798"/>
               </a:xfrm>
               <a:prstGeom prst="rect">
                 <a:avLst/>
@@ -12708,7 +12708,7 @@
               <a:grpFill/>
             </p:spPr>
             <p:txBody>
-              <a:bodyPr wrap="square" rtlCol="0">
+              <a:bodyPr wrap="square" lIns="36000" tIns="10800" rIns="36000" bIns="10800" rtlCol="0">
                 <a:spAutoFit/>
               </a:bodyPr>
               <a:lstStyle/>
@@ -12729,15 +12729,15 @@
             </p:nvGrpSpPr>
             <p:grpSpPr>
               <a:xfrm>
-                <a:off x="268941" y="4920012"/>
-                <a:ext cx="4554919" cy="1259740"/>
-                <a:chOff x="206181" y="5021903"/>
-                <a:chExt cx="5361713" cy="1259740"/>
+                <a:off x="143860" y="4921235"/>
+                <a:ext cx="4680000" cy="1257501"/>
+                <a:chOff x="58945" y="5023126"/>
+                <a:chExt cx="5508949" cy="1257501"/>
               </a:xfrm>
               <a:grpFill/>
             </p:grpSpPr>
-            <mc:AlternateContent xmlns:mc="http://schemas.openxmlformats.org/markup-compatibility/2006" xmlns:a14="http://schemas.microsoft.com/office/drawing/2010/main">
-              <mc:Choice Requires="a14">
+            <mc:AlternateContent xmlns:mc="http://schemas.openxmlformats.org/markup-compatibility/2006">
+              <mc:Choice xmlns:a14="http://schemas.microsoft.com/office/drawing/2010/main" Requires="a14">
                 <p:sp>
                   <p:nvSpPr>
                     <p:cNvPr id="11" name="TextBox 10"/>
@@ -12746,13 +12746,18 @@
                   </p:nvSpPr>
                   <p:spPr>
                     <a:xfrm>
-                      <a:off x="206181" y="5021903"/>
-                      <a:ext cx="1781938" cy="954107"/>
+                      <a:off x="82405" y="5023126"/>
+                      <a:ext cx="1721442" cy="734802"/>
                     </a:xfrm>
                     <a:prstGeom prst="rect">
                       <a:avLst/>
                     </a:prstGeom>
                     <a:grpFill/>
+                    <a:ln>
+                      <a:solidFill>
+                        <a:schemeClr val="accent1"/>
+                      </a:solidFill>
+                    </a:ln>
                   </p:spPr>
                   <p:txBody>
                     <a:bodyPr wrap="square" rtlCol="0">
@@ -12775,10 +12780,16 @@
                         <a:t>~ </a:t>
                       </a:r>
                       <a:r>
+                        <a:rPr lang="en-AU" sz="1200" b="1" dirty="0">
+                          <a:latin typeface="Palace Script MT" pitchFamily="66" charset="0"/>
+                        </a:rPr>
+                        <a:t>N</a:t>
+                      </a:r>
+                      <a:r>
                         <a:rPr lang="en-AU" sz="1200" dirty="0">
                           <a:latin typeface="Palace Script MT" pitchFamily="66" charset="0"/>
                         </a:rPr>
-                        <a:t>N </a:t>
+                        <a:t> </a:t>
                       </a:r>
                       <a:r>
                         <a:rPr lang="en-AU" sz="1200" dirty="0" smtClean="0"/>
@@ -12893,7 +12904,13 @@
                         <a:rPr lang="en-AU" sz="1200" dirty="0">
                           <a:latin typeface="Palace Script MT" pitchFamily="66" charset="0"/>
                         </a:rPr>
-                        <a:t>~ N </a:t>
+                        <a:t>~ </a:t>
+                      </a:r>
+                      <a:r>
+                        <a:rPr lang="en-AU" sz="1200" b="1" dirty="0">
+                          <a:latin typeface="Palace Script MT" pitchFamily="66" charset="0"/>
+                        </a:rPr>
+                        <a:t>N </a:t>
                       </a:r>
                       <a:r>
                         <a:rPr lang="en-AU" sz="1200" dirty="0"/>
@@ -13003,7 +13020,7 @@
                   </p:txBody>
                 </p:sp>
               </mc:Choice>
-              <mc:Fallback xmlns="">
+              <mc:Fallback>
                 <p:sp>
                   <p:nvSpPr>
                     <p:cNvPr id="11" name="TextBox 10"/>
@@ -13014,8 +13031,8 @@
                   </p:nvSpPr>
                   <p:spPr>
                     <a:xfrm>
-                      <a:off x="206181" y="5021903"/>
-                      <a:ext cx="1781938" cy="954107"/>
+                      <a:off x="82405" y="5023126"/>
+                      <a:ext cx="1721442" cy="734802"/>
                     </a:xfrm>
                     <a:prstGeom prst="rect">
                       <a:avLst/>
@@ -13023,9 +13040,14 @@
                     <a:blipFill rotWithShape="0">
                       <a:blip r:embed="rId7"/>
                       <a:stretch>
-                        <a:fillRect l="-1205" t="-1020"/>
+                        <a:fillRect l="-826" t="-654" b="-4575"/>
                       </a:stretch>
                     </a:blipFill>
+                    <a:ln>
+                      <a:solidFill>
+                        <a:schemeClr val="accent1"/>
+                      </a:solidFill>
+                    </a:ln>
                   </p:spPr>
                   <p:txBody>
                     <a:bodyPr/>
@@ -13042,8 +13064,8 @@
                 </p:sp>
               </mc:Fallback>
             </mc:AlternateContent>
-            <mc:AlternateContent xmlns:mc="http://schemas.openxmlformats.org/markup-compatibility/2006" xmlns:a14="http://schemas.microsoft.com/office/drawing/2010/main">
-              <mc:Choice Requires="a14">
+            <mc:AlternateContent xmlns:mc="http://schemas.openxmlformats.org/markup-compatibility/2006">
+              <mc:Choice xmlns:a14="http://schemas.microsoft.com/office/drawing/2010/main" Requires="a14">
                 <p:sp>
                   <p:nvSpPr>
                     <p:cNvPr id="14" name="TextBox 13"/>
@@ -13052,8 +13074,8 @@
                   </p:nvSpPr>
                   <p:spPr>
                     <a:xfrm>
-                      <a:off x="2191176" y="5179617"/>
-                      <a:ext cx="2342165" cy="244934"/>
+                      <a:off x="2270132" y="5169816"/>
+                      <a:ext cx="2196882" cy="247230"/>
                     </a:xfrm>
                     <a:prstGeom prst="rect">
                       <a:avLst/>
@@ -13077,7 +13099,7 @@
                           </m:oMathParaPr>
                           <m:oMath xmlns:m="http://schemas.openxmlformats.org/officeDocument/2006/math">
                             <m:r>
-                              <a:rPr lang="en-AU" sz="1400" i="1" smtClean="0">
+                              <a:rPr lang="en-AU" sz="1300" i="1" smtClean="0">
                                 <a:latin typeface="Cambria Math" panose="02040503050406030204" pitchFamily="18" charset="0"/>
                                 <a:ea typeface="Cambria Math" panose="02040503050406030204" pitchFamily="18" charset="0"/>
                               </a:rPr>
@@ -13086,7 +13108,7 @@
                             <m:sSub>
                               <m:sSubPr>
                                 <m:ctrlPr>
-                                  <a:rPr lang="en-AU" sz="1400" i="1">
+                                  <a:rPr lang="en-AU" sz="1300" i="1">
                                     <a:latin typeface="Cambria Math" panose="02040503050406030204" pitchFamily="18" charset="0"/>
                                     <a:ea typeface="Cambria Math" panose="02040503050406030204" pitchFamily="18" charset="0"/>
                                   </a:rPr>
@@ -13094,7 +13116,7 @@
                               </m:sSubPr>
                               <m:e>
                                 <m:r>
-                                  <a:rPr lang="en-AU" sz="1400" b="0" i="1" smtClean="0">
+                                  <a:rPr lang="en-AU" sz="1300" b="0" i="1" smtClean="0">
                                     <a:latin typeface="Cambria Math" panose="02040503050406030204" pitchFamily="18" charset="0"/>
                                   </a:rPr>
                                   <m:t>𝐼</m:t>
@@ -13102,7 +13124,7 @@
                               </m:e>
                               <m:sub>
                                 <m:r>
-                                  <a:rPr lang="en-AU" sz="1400" i="1">
+                                  <a:rPr lang="en-AU" sz="1300" i="1">
                                     <a:latin typeface="Cambria Math" panose="02040503050406030204" pitchFamily="18" charset="0"/>
                                   </a:rPr>
                                   <m:t>𝑘</m:t>
@@ -13110,32 +13132,32 @@
                               </m:sub>
                             </m:sSub>
                             <m:r>
-                              <a:rPr lang="en-AU" sz="1400" i="1">
+                              <a:rPr lang="en-AU" sz="1300" i="1">
                                 <a:latin typeface="Cambria Math" panose="02040503050406030204" pitchFamily="18" charset="0"/>
                               </a:rPr>
                               <m:t>=</m:t>
                             </m:r>
                             <m:r>
-                              <a:rPr lang="en-AU" sz="1400" b="0" i="1" smtClean="0">
+                              <a:rPr lang="en-AU" sz="1300" b="0" i="1" smtClean="0">
                                 <a:latin typeface="Cambria Math" panose="02040503050406030204" pitchFamily="18" charset="0"/>
                               </a:rPr>
                               <m:t>𝑓</m:t>
                             </m:r>
                             <m:r>
-                              <a:rPr lang="en-AU" sz="1400" i="1">
+                              <a:rPr lang="en-AU" sz="1300" i="1">
                                 <a:latin typeface="Cambria Math" panose="02040503050406030204" pitchFamily="18" charset="0"/>
                               </a:rPr>
                               <m:t>(</m:t>
                             </m:r>
                             <m:r>
-                              <a:rPr lang="en-AU" sz="1400" b="0" i="1" smtClean="0">
+                              <a:rPr lang="en-AU" sz="1300" b="0" i="1" smtClean="0">
                                 <a:latin typeface="Cambria Math" panose="02040503050406030204" pitchFamily="18" charset="0"/>
                                 <a:ea typeface="Cambria Math" panose="02040503050406030204" pitchFamily="18" charset="0"/>
                               </a:rPr>
                               <m:t>∆</m:t>
                             </m:r>
                             <m:r>
-                              <a:rPr lang="en-AU" sz="1400" b="0" i="1" smtClean="0">
+                              <a:rPr lang="en-AU" sz="1300" b="0" i="1" smtClean="0">
                                 <a:latin typeface="Cambria Math" panose="02040503050406030204" pitchFamily="18" charset="0"/>
                               </a:rPr>
                               <m:t> </m:t>
@@ -13143,14 +13165,14 @@
                             <m:sSub>
                               <m:sSubPr>
                                 <m:ctrlPr>
-                                  <a:rPr lang="en-AU" sz="1400" b="0" i="1" smtClean="0">
+                                  <a:rPr lang="en-AU" sz="1300" b="0" i="1" smtClean="0">
                                     <a:latin typeface="Cambria Math" panose="02040503050406030204" pitchFamily="18" charset="0"/>
                                   </a:rPr>
                                 </m:ctrlPr>
                               </m:sSubPr>
                               <m:e>
                                 <m:r>
-                                  <a:rPr lang="en-AU" sz="1400" i="1">
+                                  <a:rPr lang="en-AU" sz="1300" i="1">
                                     <a:latin typeface="Cambria Math" panose="02040503050406030204" pitchFamily="18" charset="0"/>
                                   </a:rPr>
                                   <m:t>𝐼</m:t>
@@ -13158,13 +13180,13 @@
                               </m:e>
                               <m:sub>
                                 <m:r>
-                                  <a:rPr lang="en-AU" sz="1400" i="1">
+                                  <a:rPr lang="en-AU" sz="1300" i="1">
                                     <a:latin typeface="Cambria Math" panose="02040503050406030204" pitchFamily="18" charset="0"/>
                                   </a:rPr>
                                   <m:t>𝑘</m:t>
                                 </m:r>
                                 <m:r>
-                                  <a:rPr lang="en-AU" sz="1400" i="1">
+                                  <a:rPr lang="en-AU" sz="1300" i="1">
                                     <a:latin typeface="Cambria Math" panose="02040503050406030204" pitchFamily="18" charset="0"/>
                                   </a:rPr>
                                   <m:t>−1</m:t>
@@ -13172,45 +13194,108 @@
                               </m:sub>
                             </m:sSub>
                             <m:r>
-                              <a:rPr lang="en-AU" sz="1400" i="1">
+                              <a:rPr lang="en-AU" sz="1300" b="0" i="1" smtClean="0">
                                 <a:latin typeface="Cambria Math" panose="02040503050406030204" pitchFamily="18" charset="0"/>
                               </a:rPr>
-                              <m:t>) +</m:t>
+                              <m:t>, </m:t>
                             </m:r>
-                            <m:sSub>
-                              <m:sSubPr>
+                            <m:sSubSup>
+                              <m:sSubSupPr>
                                 <m:ctrlPr>
-                                  <a:rPr lang="en-AU" sz="1400" b="0" i="1" smtClean="0">
+                                  <a:rPr lang="en-AU" sz="1300" b="0" i="1" smtClean="0">
                                     <a:latin typeface="Cambria Math" panose="02040503050406030204" pitchFamily="18" charset="0"/>
                                   </a:rPr>
                                 </m:ctrlPr>
-                              </m:sSubPr>
+                              </m:sSubSupPr>
                               <m:e>
                                 <m:r>
-                                  <a:rPr lang="en-AU" sz="1400" b="0" i="1" smtClean="0">
+                                  <a:rPr lang="en-AU" sz="1300" b="1" i="1" smtClean="0">
                                     <a:latin typeface="Cambria Math" panose="02040503050406030204" pitchFamily="18" charset="0"/>
                                   </a:rPr>
-                                  <m:t>𝑤</m:t>
+                                  <m:t>𝒇</m:t>
                                 </m:r>
                               </m:e>
                               <m:sub>
                                 <m:r>
-                                  <a:rPr lang="en-AU" sz="1400" b="0" i="1" smtClean="0">
+                                  <a:rPr lang="en-AU" sz="1300" b="0" i="1" smtClean="0">
                                     <a:latin typeface="Cambria Math" panose="02040503050406030204" pitchFamily="18" charset="0"/>
                                   </a:rPr>
                                   <m:t>𝑘</m:t>
                                 </m:r>
                               </m:sub>
-                            </m:sSub>
+                              <m:sup>
+                                <m:r>
+                                  <m:rPr>
+                                    <m:sty m:val="p"/>
+                                  </m:rPr>
+                                  <a:rPr lang="en-AU" sz="1300" b="0" i="0" smtClean="0">
+                                    <a:latin typeface="Cambria Math" panose="02040503050406030204" pitchFamily="18" charset="0"/>
+                                  </a:rPr>
+                                  <m:t>b</m:t>
+                                </m:r>
+                              </m:sup>
+                            </m:sSubSup>
+                            <m:r>
+                              <a:rPr lang="en-AU" sz="1300" b="0" i="1" smtClean="0">
+                                <a:latin typeface="Cambria Math" panose="02040503050406030204" pitchFamily="18" charset="0"/>
+                              </a:rPr>
+                              <m:t>,</m:t>
+                            </m:r>
+                            <m:sSubSup>
+                              <m:sSubSupPr>
+                                <m:ctrlPr>
+                                  <a:rPr lang="en-AU" sz="1300" b="0" i="1" smtClean="0">
+                                    <a:latin typeface="Cambria Math" panose="02040503050406030204" pitchFamily="18" charset="0"/>
+                                    <a:ea typeface="Cambria Math" panose="02040503050406030204" pitchFamily="18" charset="0"/>
+                                  </a:rPr>
+                                </m:ctrlPr>
+                              </m:sSubSupPr>
+                              <m:e>
+                                <m:r>
+                                  <a:rPr lang="en-AU" sz="1300" b="1" i="1" smtClean="0">
+                                    <a:latin typeface="Cambria Math" panose="02040503050406030204" pitchFamily="18" charset="0"/>
+                                    <a:ea typeface="Cambria Math" panose="02040503050406030204" pitchFamily="18" charset="0"/>
+                                  </a:rPr>
+                                  <m:t>𝝎</m:t>
+                                </m:r>
+                              </m:e>
+                              <m:sub>
+                                <m:r>
+                                  <a:rPr lang="en-AU" sz="1300" b="0" i="1" smtClean="0">
+                                    <a:latin typeface="Cambria Math" panose="02040503050406030204" pitchFamily="18" charset="0"/>
+                                    <a:ea typeface="Cambria Math" panose="02040503050406030204" pitchFamily="18" charset="0"/>
+                                  </a:rPr>
+                                  <m:t>𝑘</m:t>
+                                </m:r>
+                              </m:sub>
+                              <m:sup>
+                                <m:r>
+                                  <m:rPr>
+                                    <m:sty m:val="p"/>
+                                  </m:rPr>
+                                  <a:rPr lang="en-AU" sz="1300" b="0" i="0" smtClean="0">
+                                    <a:latin typeface="Cambria Math" panose="02040503050406030204" pitchFamily="18" charset="0"/>
+                                    <a:ea typeface="Cambria Math" panose="02040503050406030204" pitchFamily="18" charset="0"/>
+                                  </a:rPr>
+                                  <m:t>b</m:t>
+                                </m:r>
+                              </m:sup>
+                            </m:sSubSup>
+                            <m:r>
+                              <a:rPr lang="en-AU" sz="1300" i="1">
+                                <a:latin typeface="Cambria Math" panose="02040503050406030204" pitchFamily="18" charset="0"/>
+                              </a:rPr>
+                              <m:t>)</m:t>
+                            </m:r>
                           </m:oMath>
                         </m:oMathPara>
                       </a14:m>
-                      <a:endParaRPr lang="en-AU" sz="1400" dirty="0"/>
+                      <a:endParaRPr lang="en-AU" sz="1300" dirty="0"/>
                     </a:p>
                   </p:txBody>
                 </p:sp>
               </mc:Choice>
-              <mc:Fallback xmlns="">
+              <mc:Fallback>
                 <p:sp>
                   <p:nvSpPr>
                     <p:cNvPr id="14" name="TextBox 13"/>
@@ -13221,8 +13306,8 @@
                   </p:nvSpPr>
                   <p:spPr>
                     <a:xfrm>
-                      <a:off x="2191176" y="5179617"/>
-                      <a:ext cx="2342165" cy="244934"/>
+                      <a:off x="2270132" y="5169816"/>
+                      <a:ext cx="2196882" cy="247230"/>
                     </a:xfrm>
                     <a:prstGeom prst="rect">
                       <a:avLst/>
@@ -13230,7 +13315,7 @@
                     <a:blipFill rotWithShape="0">
                       <a:blip r:embed="rId8"/>
                       <a:stretch>
-                        <a:fillRect b="-5882"/>
+                        <a:fillRect b="-7843"/>
                       </a:stretch>
                     </a:blipFill>
                     <a:ln>
@@ -13260,14 +13345,14 @@
               </p:nvCxnSpPr>
               <p:spPr>
                 <a:xfrm flipV="1">
-                  <a:off x="4635610" y="5550068"/>
+                  <a:off x="4635610" y="5390887"/>
                   <a:ext cx="932284" cy="12324"/>
                 </a:xfrm>
                 <a:prstGeom prst="straightConnector1">
                   <a:avLst/>
                 </a:prstGeom>
                 <a:grpFill/>
-                <a:ln>
+                <a:ln w="25400">
                   <a:tailEnd type="triangle"/>
                 </a:ln>
               </p:spPr>
@@ -13294,8 +13379,8 @@
               </p:nvCxnSpPr>
               <p:spPr>
                 <a:xfrm rot="10800000" flipV="1">
-                  <a:off x="4162316" y="5558141"/>
-                  <a:ext cx="858372" cy="717153"/>
+                  <a:off x="4139256" y="5406821"/>
+                  <a:ext cx="881432" cy="873806"/>
                 </a:xfrm>
                 <a:prstGeom prst="bentConnector3">
                   <a:avLst>
@@ -13303,7 +13388,7 @@
                   </a:avLst>
                 </a:prstGeom>
                 <a:grpFill/>
-                <a:ln>
+                <a:ln w="25400">
                   <a:tailEnd type="arrow"/>
                 </a:ln>
               </p:spPr>
@@ -13330,14 +13415,14 @@
               </p:nvCxnSpPr>
               <p:spPr>
                 <a:xfrm flipV="1">
-                  <a:off x="1568817" y="5818094"/>
+                  <a:off x="1568817" y="5954535"/>
                   <a:ext cx="555812" cy="6350"/>
                 </a:xfrm>
                 <a:prstGeom prst="straightConnector1">
                   <a:avLst/>
                 </a:prstGeom>
                 <a:grpFill/>
-                <a:ln>
+                <a:ln w="25400">
                   <a:tailEnd type="arrow"/>
                 </a:ln>
               </p:spPr>
@@ -13364,13 +13449,14 @@
               </p:nvCxnSpPr>
               <p:spPr>
                 <a:xfrm rot="5400000">
-                  <a:off x="1340218" y="6053043"/>
-                  <a:ext cx="457199" cy="1"/>
+                  <a:off x="1418408" y="6115892"/>
+                  <a:ext cx="300819" cy="1"/>
                 </a:xfrm>
                 <a:prstGeom prst="bentConnector3">
                   <a:avLst/>
                 </a:prstGeom>
                 <a:grpFill/>
+                <a:ln w="25400"/>
               </p:spPr>
               <p:style>
                 <a:lnRef idx="1">
@@ -13402,6 +13488,7 @@
                   <a:avLst/>
                 </a:prstGeom>
                 <a:grpFill/>
+                <a:ln w="25400"/>
               </p:spPr>
               <p:style>
                 <a:lnRef idx="1">
@@ -13426,14 +13513,14 @@
               </p:nvCxnSpPr>
               <p:spPr>
                 <a:xfrm flipV="1">
-                  <a:off x="206181" y="5538406"/>
-                  <a:ext cx="1918448" cy="12554"/>
+                  <a:off x="58945" y="5409546"/>
+                  <a:ext cx="2118827" cy="12554"/>
                 </a:xfrm>
                 <a:prstGeom prst="straightConnector1">
                   <a:avLst/>
                 </a:prstGeom>
                 <a:grpFill/>
-                <a:ln>
+                <a:ln w="25400">
                   <a:tailEnd type="triangle"/>
                 </a:ln>
               </p:spPr>
@@ -13453,8 +13540,8 @@
               </p:style>
             </p:cxnSp>
           </p:grpSp>
-          <mc:AlternateContent xmlns:mc="http://schemas.openxmlformats.org/markup-compatibility/2006" xmlns:a14="http://schemas.microsoft.com/office/drawing/2010/main">
-            <mc:Choice Requires="a14">
+          <mc:AlternateContent xmlns:mc="http://schemas.openxmlformats.org/markup-compatibility/2006">
+            <mc:Choice xmlns:a14="http://schemas.microsoft.com/office/drawing/2010/main" Requires="a14">
               <p:sp>
                 <p:nvSpPr>
                   <p:cNvPr id="1042" name="TextBox 1041"/>
@@ -13463,8 +13550,8 @@
                 </p:nvSpPr>
                 <p:spPr>
                   <a:xfrm>
-                    <a:off x="4852102" y="5045987"/>
-                    <a:ext cx="1178937" cy="553346"/>
+                    <a:off x="4826225" y="5045987"/>
+                    <a:ext cx="1070208" cy="553346"/>
                   </a:xfrm>
                   <a:prstGeom prst="rect">
                     <a:avLst/>
@@ -13472,7 +13559,7 @@
                   <a:grpFill/>
                 </p:spPr>
                 <p:txBody>
-                  <a:bodyPr wrap="square" rtlCol="0">
+                  <a:bodyPr wrap="square" lIns="36000" rIns="36000" rtlCol="0">
                     <a:spAutoFit/>
                   </a:bodyPr>
                   <a:lstStyle/>
@@ -13488,13 +13575,29 @@
                             <m:rPr>
                               <m:nor/>
                             </m:rPr>
-                            <a:rPr lang="en-AU" sz="1200" dirty="0" smtClean="0">
+                            <a:rPr lang="en-AU" sz="1200" b="1" dirty="0" smtClean="0">
+                              <a:ln w="12700">
+                                <a:solidFill>
+                                  <a:schemeClr val="tx1"/>
+                                </a:solidFill>
+                              </a:ln>
+                              <a:solidFill>
+                                <a:schemeClr val="tx1"/>
+                              </a:solidFill>
                               <a:latin typeface="Palace Script MT" pitchFamily="66" charset="0"/>
                             </a:rPr>
                             <m:t>N</m:t>
                           </m:r>
                           <m:r>
                             <a:rPr lang="en-US" sz="1200" b="0" i="1" dirty="0" smtClean="0">
+                              <a:ln w="12700">
+                                <a:solidFill>
+                                  <a:schemeClr val="tx1"/>
+                                </a:solidFill>
+                              </a:ln>
+                              <a:solidFill>
+                                <a:schemeClr val="tx1"/>
+                              </a:solidFill>
                               <a:latin typeface="Cambria Math"/>
                             </a:rPr>
                             <m:t>(</m:t>
@@ -13511,6 +13614,14 @@
                               </m:mcs>
                               <m:ctrlPr>
                                 <a:rPr lang="en-US" sz="1200" i="1">
+                                  <a:ln w="12700">
+                                    <a:solidFill>
+                                      <a:schemeClr val="tx1"/>
+                                    </a:solidFill>
+                                  </a:ln>
+                                  <a:solidFill>
+                                    <a:schemeClr val="tx1"/>
+                                  </a:solidFill>
                                   <a:latin typeface="Cambria Math" panose="02040503050406030204" pitchFamily="18" charset="0"/>
                                 </a:rPr>
                               </m:ctrlPr>
@@ -13519,6 +13630,14 @@
                               <m:e>
                                 <m:r>
                                   <a:rPr lang="en-AU" sz="1200" i="1">
+                                    <a:ln w="12700">
+                                      <a:solidFill>
+                                        <a:schemeClr val="tx1"/>
+                                      </a:solidFill>
+                                    </a:ln>
+                                    <a:solidFill>
+                                      <a:schemeClr val="tx1"/>
+                                    </a:solidFill>
                                     <a:latin typeface="Cambria Math"/>
                                     <a:ea typeface="Cambria Math"/>
                                   </a:rPr>
@@ -13528,6 +13647,14 @@
                                   <m:sSubPr>
                                     <m:ctrlPr>
                                       <a:rPr lang="en-AU" sz="1200" i="1" smtClean="0">
+                                        <a:ln w="12700">
+                                          <a:solidFill>
+                                            <a:schemeClr val="tx1"/>
+                                          </a:solidFill>
+                                        </a:ln>
+                                        <a:solidFill>
+                                          <a:schemeClr val="tx1"/>
+                                        </a:solidFill>
                                         <a:latin typeface="Cambria Math" panose="02040503050406030204" pitchFamily="18" charset="0"/>
                                         <a:ea typeface="Cambria Math"/>
                                       </a:rPr>
@@ -13536,6 +13663,14 @@
                                   <m:e>
                                     <m:r>
                                       <a:rPr lang="en-US" sz="1200" b="1" i="1" smtClean="0">
+                                        <a:ln w="12700">
+                                          <a:solidFill>
+                                            <a:schemeClr val="tx1"/>
+                                          </a:solidFill>
+                                        </a:ln>
+                                        <a:solidFill>
+                                          <a:schemeClr val="tx1"/>
+                                        </a:solidFill>
                                         <a:latin typeface="Cambria Math" panose="02040503050406030204" pitchFamily="18" charset="0"/>
                                         <a:ea typeface="Cambria Math"/>
                                       </a:rPr>
@@ -13545,6 +13680,14 @@
                                   <m:sub>
                                     <m:r>
                                       <a:rPr lang="en-US" sz="1200" b="0" i="1" smtClean="0">
+                                        <a:ln w="12700">
+                                          <a:solidFill>
+                                            <a:schemeClr val="tx1"/>
+                                          </a:solidFill>
+                                        </a:ln>
+                                        <a:solidFill>
+                                          <a:schemeClr val="tx1"/>
+                                        </a:solidFill>
                                         <a:latin typeface="Cambria Math"/>
                                         <a:ea typeface="Cambria Math"/>
                                       </a:rPr>
@@ -13552,6 +13695,14 @@
                                     </m:r>
                                     <m:r>
                                       <a:rPr lang="en-US" sz="1200" b="0" i="1" smtClean="0">
+                                        <a:ln w="12700">
+                                          <a:solidFill>
+                                            <a:schemeClr val="tx1"/>
+                                          </a:solidFill>
+                                        </a:ln>
+                                        <a:solidFill>
+                                          <a:schemeClr val="tx1"/>
+                                        </a:solidFill>
                                         <a:latin typeface="Cambria Math"/>
                                         <a:ea typeface="Cambria Math"/>
                                       </a:rPr>
@@ -13559,6 +13710,14 @@
                                     </m:r>
                                     <m:r>
                                       <a:rPr lang="en-US" sz="1200" b="0" i="1" smtClean="0">
+                                        <a:ln w="12700">
+                                          <a:solidFill>
+                                            <a:schemeClr val="tx1"/>
+                                          </a:solidFill>
+                                        </a:ln>
+                                        <a:solidFill>
+                                          <a:schemeClr val="tx1"/>
+                                        </a:solidFill>
                                         <a:latin typeface="Cambria Math"/>
                                         <a:ea typeface="Cambria Math"/>
                                       </a:rPr>
@@ -13566,6 +13725,14 @@
                                     </m:r>
                                     <m:r>
                                       <a:rPr lang="en-US" sz="1200" b="0" i="1" smtClean="0">
+                                        <a:ln w="12700">
+                                          <a:solidFill>
+                                            <a:schemeClr val="tx1"/>
+                                          </a:solidFill>
+                                        </a:ln>
+                                        <a:solidFill>
+                                          <a:schemeClr val="tx1"/>
+                                        </a:solidFill>
                                         <a:latin typeface="Cambria Math"/>
                                         <a:ea typeface="Cambria Math"/>
                                       </a:rPr>
@@ -13579,6 +13746,14 @@
                               <m:e>
                                 <m:r>
                                   <a:rPr lang="en-AU" sz="1200" i="1">
+                                    <a:ln w="12700">
+                                      <a:solidFill>
+                                        <a:schemeClr val="tx1"/>
+                                      </a:solidFill>
+                                    </a:ln>
+                                    <a:solidFill>
+                                      <a:schemeClr val="tx1"/>
+                                    </a:solidFill>
                                     <a:latin typeface="Cambria Math"/>
                                     <a:ea typeface="Cambria Math"/>
                                   </a:rPr>
@@ -13588,6 +13763,14 @@
                                   <m:sSubPr>
                                     <m:ctrlPr>
                                       <a:rPr lang="en-AU" sz="1200" i="1">
+                                        <a:ln w="12700">
+                                          <a:solidFill>
+                                            <a:schemeClr val="tx1"/>
+                                          </a:solidFill>
+                                        </a:ln>
+                                        <a:solidFill>
+                                          <a:schemeClr val="tx1"/>
+                                        </a:solidFill>
                                         <a:latin typeface="Cambria Math" panose="02040503050406030204" pitchFamily="18" charset="0"/>
                                         <a:ea typeface="Cambria Math"/>
                                       </a:rPr>
@@ -13596,6 +13779,14 @@
                                   <m:e>
                                     <m:r>
                                       <a:rPr lang="en-US" sz="1200" b="1" i="1" smtClean="0">
+                                        <a:ln w="12700">
+                                          <a:solidFill>
+                                            <a:schemeClr val="tx1"/>
+                                          </a:solidFill>
+                                        </a:ln>
+                                        <a:solidFill>
+                                          <a:schemeClr val="tx1"/>
+                                        </a:solidFill>
                                         <a:latin typeface="Cambria Math"/>
                                         <a:ea typeface="Cambria Math"/>
                                       </a:rPr>
@@ -13605,6 +13796,14 @@
                                   <m:sub>
                                     <m:r>
                                       <a:rPr lang="en-US" sz="1200" b="0" i="1" smtClean="0">
+                                        <a:ln w="12700">
+                                          <a:solidFill>
+                                            <a:schemeClr val="tx1"/>
+                                          </a:solidFill>
+                                        </a:ln>
+                                        <a:solidFill>
+                                          <a:schemeClr val="tx1"/>
+                                        </a:solidFill>
                                         <a:latin typeface="Cambria Math"/>
                                         <a:ea typeface="Cambria Math"/>
                                       </a:rPr>
@@ -13612,6 +13811,14 @@
                                     </m:r>
                                     <m:r>
                                       <a:rPr lang="en-US" sz="1200" b="0" i="1" smtClean="0">
+                                        <a:ln w="12700">
+                                          <a:solidFill>
+                                            <a:schemeClr val="tx1"/>
+                                          </a:solidFill>
+                                        </a:ln>
+                                        <a:solidFill>
+                                          <a:schemeClr val="tx1"/>
+                                        </a:solidFill>
                                         <a:latin typeface="Cambria Math"/>
                                         <a:ea typeface="Cambria Math"/>
                                       </a:rPr>
@@ -13619,6 +13826,14 @@
                                     </m:r>
                                     <m:r>
                                       <a:rPr lang="en-US" sz="1200" i="1">
+                                        <a:ln w="12700">
+                                          <a:solidFill>
+                                            <a:schemeClr val="tx1"/>
+                                          </a:solidFill>
+                                        </a:ln>
+                                        <a:solidFill>
+                                          <a:schemeClr val="tx1"/>
+                                        </a:solidFill>
                                         <a:latin typeface="Cambria Math"/>
                                         <a:ea typeface="Cambria Math"/>
                                       </a:rPr>
@@ -13626,6 +13841,14 @@
                                     </m:r>
                                     <m:r>
                                       <a:rPr lang="en-US" sz="1200" i="1">
+                                        <a:ln w="12700">
+                                          <a:solidFill>
+                                            <a:schemeClr val="tx1"/>
+                                          </a:solidFill>
+                                        </a:ln>
+                                        <a:solidFill>
+                                          <a:schemeClr val="tx1"/>
+                                        </a:solidFill>
                                         <a:latin typeface="Cambria Math"/>
                                         <a:ea typeface="Cambria Math"/>
                                       </a:rPr>
@@ -13639,6 +13862,14 @@
                               <m:e>
                                 <m:r>
                                   <a:rPr lang="en-AU" sz="1200" i="1">
+                                    <a:ln w="12700">
+                                      <a:solidFill>
+                                        <a:schemeClr val="tx1"/>
+                                      </a:solidFill>
+                                    </a:ln>
+                                    <a:solidFill>
+                                      <a:schemeClr val="tx1"/>
+                                    </a:solidFill>
                                     <a:latin typeface="Cambria Math"/>
                                     <a:ea typeface="Cambria Math"/>
                                   </a:rPr>
@@ -13648,6 +13879,14 @@
                                   <m:sSubSupPr>
                                     <m:ctrlPr>
                                       <a:rPr lang="en-AU" sz="1200" i="1">
+                                        <a:ln w="12700">
+                                          <a:solidFill>
+                                            <a:schemeClr val="tx1"/>
+                                          </a:solidFill>
+                                        </a:ln>
+                                        <a:solidFill>
+                                          <a:schemeClr val="tx1"/>
+                                        </a:solidFill>
                                         <a:latin typeface="Cambria Math" panose="02040503050406030204" pitchFamily="18" charset="0"/>
                                       </a:rPr>
                                     </m:ctrlPr>
@@ -13655,6 +13894,14 @@
                                   <m:e>
                                     <m:r>
                                       <a:rPr lang="en-US" sz="1200" b="1" i="1">
+                                        <a:ln w="12700">
+                                          <a:solidFill>
+                                            <a:schemeClr val="tx1"/>
+                                          </a:solidFill>
+                                        </a:ln>
+                                        <a:solidFill>
+                                          <a:schemeClr val="tx1"/>
+                                        </a:solidFill>
                                         <a:latin typeface="Cambria Math"/>
                                       </a:rPr>
                                       <m:t>𝒑</m:t>
@@ -13663,24 +13910,56 @@
                                   <m:sub>
                                     <m:r>
                                       <a:rPr lang="en-US" sz="1200" b="0" i="1" smtClean="0">
+                                        <a:ln w="12700">
+                                          <a:solidFill>
+                                            <a:schemeClr val="tx1"/>
+                                          </a:solidFill>
+                                        </a:ln>
+                                        <a:solidFill>
+                                          <a:schemeClr val="tx1"/>
+                                        </a:solidFill>
                                         <a:latin typeface="Cambria Math"/>
                                       </a:rPr>
                                       <m:t>𝑖</m:t>
                                     </m:r>
                                     <m:r>
                                       <a:rPr lang="en-US" sz="1200" b="0" i="1" smtClean="0">
+                                        <a:ln w="12700">
+                                          <a:solidFill>
+                                            <a:schemeClr val="tx1"/>
+                                          </a:solidFill>
+                                        </a:ln>
+                                        <a:solidFill>
+                                          <a:schemeClr val="tx1"/>
+                                        </a:solidFill>
                                         <a:latin typeface="Cambria Math"/>
                                       </a:rPr>
                                       <m:t>, </m:t>
                                     </m:r>
                                     <m:r>
                                       <a:rPr lang="en-US" sz="1200" b="0" i="1" smtClean="0">
+                                        <a:ln w="12700">
+                                          <a:solidFill>
+                                            <a:schemeClr val="tx1"/>
+                                          </a:solidFill>
+                                        </a:ln>
+                                        <a:solidFill>
+                                          <a:schemeClr val="tx1"/>
+                                        </a:solidFill>
                                         <a:latin typeface="Cambria Math"/>
                                       </a:rPr>
                                       <m:t>𝑘</m:t>
                                     </m:r>
                                     <m:r>
                                       <a:rPr lang="en-US" sz="1200" b="0" i="1" smtClean="0">
+                                        <a:ln w="12700">
+                                          <a:solidFill>
+                                            <a:schemeClr val="tx1"/>
+                                          </a:solidFill>
+                                        </a:ln>
+                                        <a:solidFill>
+                                          <a:schemeClr val="tx1"/>
+                                        </a:solidFill>
                                         <a:latin typeface="Cambria Math"/>
                                       </a:rPr>
                                       <m:t>+1</m:t>
@@ -13689,6 +13968,14 @@
                                   <m:sup>
                                     <m:r>
                                       <a:rPr lang="en-US" sz="1200" i="1">
+                                        <a:ln w="12700">
+                                          <a:solidFill>
+                                            <a:schemeClr val="tx1"/>
+                                          </a:solidFill>
+                                        </a:ln>
+                                        <a:solidFill>
+                                          <a:schemeClr val="tx1"/>
+                                        </a:solidFill>
                                         <a:latin typeface="Cambria Math"/>
                                       </a:rPr>
                                       <m:t>+</m:t>
@@ -13700,6 +13987,14 @@
                           </m:m>
                           <m:r>
                             <a:rPr lang="en-US" sz="1200" b="0" i="1" smtClean="0">
+                              <a:ln w="12700">
+                                <a:solidFill>
+                                  <a:schemeClr val="tx1"/>
+                                </a:solidFill>
+                              </a:ln>
+                              <a:solidFill>
+                                <a:schemeClr val="tx1"/>
+                              </a:solidFill>
                               <a:latin typeface="Cambria Math"/>
                             </a:rPr>
                             <m:t>,</m:t>
@@ -13708,25 +14003,60 @@
                             <m:rPr>
                               <m:nor/>
                             </m:rPr>
-                            <a:rPr lang="el-GR" sz="1200" dirty="0"/>
+                            <a:rPr lang="el-GR" sz="1200" dirty="0">
+                              <a:ln w="12700">
+                                <a:solidFill>
+                                  <a:schemeClr val="tx1"/>
+                                </a:solidFill>
+                              </a:ln>
+                              <a:solidFill>
+                                <a:schemeClr val="tx1"/>
+                              </a:solidFill>
+                            </a:rPr>
                             <m:t>Σ</m:t>
                           </m:r>
                           <m:r>
                             <m:rPr>
                               <m:nor/>
                             </m:rPr>
-                            <a:rPr lang="en-US" sz="1200" b="0" i="0" baseline="-25000" dirty="0" smtClean="0"/>
+                            <a:rPr lang="en-US" sz="1200" b="0" i="0" baseline="-25000" dirty="0" smtClean="0">
+                              <a:ln w="12700">
+                                <a:solidFill>
+                                  <a:schemeClr val="tx1"/>
+                                </a:solidFill>
+                              </a:ln>
+                              <a:solidFill>
+                                <a:schemeClr val="tx1"/>
+                              </a:solidFill>
+                            </a:rPr>
                             <m:t>k</m:t>
                           </m:r>
                           <m:r>
                             <m:rPr>
                               <m:nor/>
                             </m:rPr>
-                            <a:rPr lang="en-US" sz="1200" b="0" i="0" baseline="-25000" dirty="0" smtClean="0"/>
+                            <a:rPr lang="en-US" sz="1200" b="0" i="0" baseline="-25000" dirty="0" smtClean="0">
+                              <a:ln w="12700">
+                                <a:solidFill>
+                                  <a:schemeClr val="tx1"/>
+                                </a:solidFill>
+                              </a:ln>
+                              <a:solidFill>
+                                <a:schemeClr val="tx1"/>
+                              </a:solidFill>
+                            </a:rPr>
                             <m:t>+1</m:t>
                           </m:r>
                           <m:r>
                             <a:rPr lang="en-US" sz="1200" b="0" i="1" dirty="0" smtClean="0">
+                              <a:ln w="12700">
+                                <a:solidFill>
+                                  <a:schemeClr val="tx1"/>
+                                </a:solidFill>
+                              </a:ln>
+                              <a:solidFill>
+                                <a:schemeClr val="tx1"/>
+                              </a:solidFill>
                               <a:latin typeface="Cambria Math"/>
                             </a:rPr>
                             <m:t>)</m:t>
@@ -13734,12 +14064,21 @@
                         </m:oMath>
                       </m:oMathPara>
                     </a14:m>
-                    <a:endParaRPr lang="en-AU" sz="1200" dirty="0"/>
+                    <a:endParaRPr lang="en-AU" sz="1200" dirty="0">
+                      <a:ln w="12700">
+                        <a:solidFill>
+                          <a:schemeClr val="tx1"/>
+                        </a:solidFill>
+                      </a:ln>
+                      <a:solidFill>
+                        <a:schemeClr val="tx1"/>
+                      </a:solidFill>
+                    </a:endParaRPr>
                   </a:p>
                 </p:txBody>
               </p:sp>
             </mc:Choice>
-            <mc:Fallback xmlns="">
+            <mc:Fallback>
               <p:sp>
                 <p:nvSpPr>
                   <p:cNvPr id="1042" name="TextBox 1041"/>
@@ -13750,8 +14089,8 @@
                 </p:nvSpPr>
                 <p:spPr>
                   <a:xfrm>
-                    <a:off x="4852102" y="5045987"/>
-                    <a:ext cx="1178937" cy="553346"/>
+                    <a:off x="4826225" y="5045987"/>
+                    <a:ext cx="1070208" cy="553346"/>
                   </a:xfrm>
                   <a:prstGeom prst="rect">
                     <a:avLst/>
@@ -13787,7 +14126,7 @@
             <p:spPr>
               <a:xfrm>
                 <a:off x="2490189" y="6007708"/>
-                <a:ext cx="685316" cy="369332"/>
+                <a:ext cx="609705" cy="278299"/>
               </a:xfrm>
               <a:prstGeom prst="rect">
                 <a:avLst/>
@@ -13800,7 +14139,7 @@
               </a:ln>
             </p:spPr>
             <p:txBody>
-              <a:bodyPr wrap="none" rtlCol="0">
+              <a:bodyPr wrap="none" lIns="54000" tIns="36000" rIns="54000" bIns="36000" rtlCol="0">
                 <a:spAutoFit/>
               </a:bodyPr>
               <a:lstStyle/>
@@ -13822,8 +14161,8 @@
           </p:nvSpPr>
           <p:spPr>
             <a:xfrm>
-              <a:off x="1908810" y="4565162"/>
-              <a:ext cx="2105698" cy="1154063"/>
+              <a:off x="1860807" y="4429126"/>
+              <a:ext cx="2153701" cy="1343024"/>
             </a:xfrm>
             <a:prstGeom prst="rect">
               <a:avLst/>
@@ -19952,28 +20291,28 @@
                 <a:gridCol w="678596">
                   <a:extLst>
                     <a:ext uri="{9D8B030D-6E8A-4147-A177-3AD203B41FA5}">
-                      <a16:colId xmlns="" xmlns:a16="http://schemas.microsoft.com/office/drawing/2014/main" val="1969681677"/>
+                      <a16:colId xmlns:a16="http://schemas.microsoft.com/office/drawing/2014/main" xmlns="" val="1969681677"/>
                     </a:ext>
                   </a:extLst>
                 </a:gridCol>
                 <a:gridCol w="1577017">
                   <a:extLst>
                     <a:ext uri="{9D8B030D-6E8A-4147-A177-3AD203B41FA5}">
-                      <a16:colId xmlns="" xmlns:a16="http://schemas.microsoft.com/office/drawing/2014/main" val="4015357166"/>
+                      <a16:colId xmlns:a16="http://schemas.microsoft.com/office/drawing/2014/main" xmlns="" val="4015357166"/>
                     </a:ext>
                   </a:extLst>
                 </a:gridCol>
                 <a:gridCol w="1720382">
                   <a:extLst>
                     <a:ext uri="{9D8B030D-6E8A-4147-A177-3AD203B41FA5}">
-                      <a16:colId xmlns="" xmlns:a16="http://schemas.microsoft.com/office/drawing/2014/main" val="1617265938"/>
+                      <a16:colId xmlns:a16="http://schemas.microsoft.com/office/drawing/2014/main" xmlns="" val="1617265938"/>
                     </a:ext>
                   </a:extLst>
                 </a:gridCol>
                 <a:gridCol w="1596131">
                   <a:extLst>
                     <a:ext uri="{9D8B030D-6E8A-4147-A177-3AD203B41FA5}">
-                      <a16:colId xmlns="" xmlns:a16="http://schemas.microsoft.com/office/drawing/2014/main" val="1307686583"/>
+                      <a16:colId xmlns:a16="http://schemas.microsoft.com/office/drawing/2014/main" xmlns="" val="1307686583"/>
                     </a:ext>
                   </a:extLst>
                 </a:gridCol>
@@ -20028,7 +20367,7 @@
                 </a:tc>
                 <a:extLst>
                   <a:ext uri="{0D108BD9-81ED-4DB2-BD59-A6C34878D82A}">
-                    <a16:rowId xmlns="" xmlns:a16="http://schemas.microsoft.com/office/drawing/2014/main" val="758164643"/>
+                    <a16:rowId xmlns:a16="http://schemas.microsoft.com/office/drawing/2014/main" xmlns="" val="758164643"/>
                   </a:ext>
                 </a:extLst>
               </a:tr>
@@ -20123,7 +20462,7 @@
                 </a:tc>
                 <a:extLst>
                   <a:ext uri="{0D108BD9-81ED-4DB2-BD59-A6C34878D82A}">
-                    <a16:rowId xmlns="" xmlns:a16="http://schemas.microsoft.com/office/drawing/2014/main" val="3932375478"/>
+                    <a16:rowId xmlns:a16="http://schemas.microsoft.com/office/drawing/2014/main" xmlns="" val="3932375478"/>
                   </a:ext>
                 </a:extLst>
               </a:tr>
@@ -20200,7 +20539,7 @@
                 </a:tc>
                 <a:extLst>
                   <a:ext uri="{0D108BD9-81ED-4DB2-BD59-A6C34878D82A}">
-                    <a16:rowId xmlns="" xmlns:a16="http://schemas.microsoft.com/office/drawing/2014/main" val="3737485163"/>
+                    <a16:rowId xmlns:a16="http://schemas.microsoft.com/office/drawing/2014/main" xmlns="" val="3737485163"/>
                   </a:ext>
                 </a:extLst>
               </a:tr>
@@ -20323,7 +20662,7 @@
                 </a:tc>
                 <a:extLst>
                   <a:ext uri="{0D108BD9-81ED-4DB2-BD59-A6C34878D82A}">
-                    <a16:rowId xmlns="" xmlns:a16="http://schemas.microsoft.com/office/drawing/2014/main" val="4236481450"/>
+                    <a16:rowId xmlns:a16="http://schemas.microsoft.com/office/drawing/2014/main" xmlns="" val="4236481450"/>
                   </a:ext>
                 </a:extLst>
               </a:tr>
@@ -20438,7 +20777,7 @@
                 </a:tc>
                 <a:extLst>
                   <a:ext uri="{0D108BD9-81ED-4DB2-BD59-A6C34878D82A}">
-                    <a16:rowId xmlns="" xmlns:a16="http://schemas.microsoft.com/office/drawing/2014/main" val="3335519353"/>
+                    <a16:rowId xmlns:a16="http://schemas.microsoft.com/office/drawing/2014/main" xmlns="" val="3335519353"/>
                   </a:ext>
                 </a:extLst>
               </a:tr>
@@ -20527,7 +20866,7 @@
                 </a:tc>
                 <a:extLst>
                   <a:ext uri="{0D108BD9-81ED-4DB2-BD59-A6C34878D82A}">
-                    <a16:rowId xmlns="" xmlns:a16="http://schemas.microsoft.com/office/drawing/2014/main" val="1954581546"/>
+                    <a16:rowId xmlns:a16="http://schemas.microsoft.com/office/drawing/2014/main" xmlns="" val="1954581546"/>
                   </a:ext>
                 </a:extLst>
               </a:tr>
@@ -20660,7 +20999,7 @@
                 </a:tc>
                 <a:extLst>
                   <a:ext uri="{0D108BD9-81ED-4DB2-BD59-A6C34878D82A}">
-                    <a16:rowId xmlns="" xmlns:a16="http://schemas.microsoft.com/office/drawing/2014/main" val="3035050982"/>
+                    <a16:rowId xmlns:a16="http://schemas.microsoft.com/office/drawing/2014/main" xmlns="" val="3035050982"/>
                   </a:ext>
                 </a:extLst>
               </a:tr>
@@ -20792,7 +21131,7 @@
                 </a:tc>
                 <a:extLst>
                   <a:ext uri="{0D108BD9-81ED-4DB2-BD59-A6C34878D82A}">
-                    <a16:rowId xmlns="" xmlns:a16="http://schemas.microsoft.com/office/drawing/2014/main" val="2046055926"/>
+                    <a16:rowId xmlns:a16="http://schemas.microsoft.com/office/drawing/2014/main" xmlns="" val="2046055926"/>
                   </a:ext>
                 </a:extLst>
               </a:tr>
@@ -20869,7 +21208,7 @@
                 </a:tc>
                 <a:extLst>
                   <a:ext uri="{0D108BD9-81ED-4DB2-BD59-A6C34878D82A}">
-                    <a16:rowId xmlns="" xmlns:a16="http://schemas.microsoft.com/office/drawing/2014/main" val="2033872525"/>
+                    <a16:rowId xmlns:a16="http://schemas.microsoft.com/office/drawing/2014/main" xmlns="" val="2033872525"/>
                   </a:ext>
                 </a:extLst>
               </a:tr>
@@ -20989,7 +21328,7 @@
                 </a:tc>
                 <a:extLst>
                   <a:ext uri="{0D108BD9-81ED-4DB2-BD59-A6C34878D82A}">
-                    <a16:rowId xmlns="" xmlns:a16="http://schemas.microsoft.com/office/drawing/2014/main" val="1312604833"/>
+                    <a16:rowId xmlns:a16="http://schemas.microsoft.com/office/drawing/2014/main" xmlns="" val="1312604833"/>
                   </a:ext>
                 </a:extLst>
               </a:tr>

</xml_diff>